<commit_message>
visually updating the facet plot
</commit_message>
<xml_diff>
--- a/presentation/PAA_2025.pptx
+++ b/presentation/PAA_2025.pptx
@@ -169,27 +169,6 @@
 </p188:cmLst>
 </file>
 
-<file path=ppt/comments/modernComment_103_1FB47885.xml><?xml version="1.0" encoding="utf-8"?>
-<p188:cmLst xmlns:a="http://schemas.openxmlformats.org/drawingml/2006/main" xmlns:r="http://schemas.openxmlformats.org/officeDocument/2006/relationships" xmlns:p188="http://schemas.microsoft.com/office/powerpoint/2018/8/main">
-  <p188:cm id="{9A4B0BB9-C532-4442-9B2D-0047FD3D1441}" authorId="{AFA1B2A6-432F-BDAD-8948-8605949700F2}" created="2025-04-04T16:54:39.889">
-    <pc:sldMkLst xmlns:pc="http://schemas.microsoft.com/office/powerpoint/2013/main/command">
-      <pc:docMk/>
-      <pc:sldMk cId="531921029" sldId="259"/>
-    </pc:sldMkLst>
-    <p188:txBody>
-      <a:bodyPr/>
-      <a:lstStyle/>
-      <a:p>
-        <a:r>
-          <a:rPr lang="en-US"/>
-          <a:t>Trim big time</a:t>
-        </a:r>
-      </a:p>
-    </p188:txBody>
-  </p188:cm>
-</p188:cmLst>
-</file>
-
 <file path=ppt/comments/modernComment_105_2B9B8E2C.xml><?xml version="1.0" encoding="utf-8"?>
 <p188:cmLst xmlns:a="http://schemas.openxmlformats.org/drawingml/2006/main" xmlns:r="http://schemas.openxmlformats.org/officeDocument/2006/relationships" xmlns:p188="http://schemas.microsoft.com/office/powerpoint/2018/8/main">
   <p188:cm id="{F5B117F2-A789-224E-9072-D1FFD0779388}" authorId="{AFA1B2A6-432F-BDAD-8948-8605949700F2}" created="2025-04-04T17:34:59.792">
@@ -2289,83 +2268,35 @@
           <a:bodyPr/>
           <a:lstStyle/>
           <a:p>
-            <a:r>
-              <a:rPr lang="en-US" dirty="0"/>
-              <a:t>Add slide</a:t>
-            </a:r>
-          </a:p>
-          <a:p>
+            <a:pPr marL="0" indent="0">
+              <a:buNone/>
+            </a:pPr>
+            <a:r>
+              <a:rPr lang="en-US" dirty="0"/>
+              <a:t>Say these verbally</a:t>
+            </a:r>
+          </a:p>
+          <a:p>
+            <a:pPr marL="0" indent="0">
+              <a:buNone/>
+            </a:pPr>
             <a:endParaRPr lang="en-US" dirty="0"/>
           </a:p>
           <a:p>
             <a:r>
               <a:rPr lang="en-US" dirty="0"/>
-              <a:t>Collapse migration cohorts (before 1965, After 1965-1980, !980 plus)</a:t>
-            </a:r>
-          </a:p>
-          <a:p>
+              <a:t>Puerto Rico became a US territory in 1898. In 1917 they were granted US citizenship.</a:t>
+            </a:r>
+            <a:br>
+              <a:rPr lang="en-US" dirty="0"/>
+            </a:br>
             <a:endParaRPr lang="en-US" dirty="0"/>
           </a:p>
           <a:p>
             <a:r>
               <a:rPr lang="en-US" dirty="0"/>
-              <a:t>So here’s a bit of background on their home countries:</a:t>
-            </a:r>
-          </a:p>
-          <a:p>
-            <a:endParaRPr lang="en-US" dirty="0"/>
-          </a:p>
-          <a:p>
-            <a:r>
-              <a:rPr lang="en-US" dirty="0"/>
-              <a:t>In 1917, the Jones act granted US citizenship to Puerto Ricans which allowed them the ability to freely move to the US mainland. Today more than half of Puerto Ricans live outside of their country (mostly in the US) (</a:t>
-            </a:r>
-            <a:r>
-              <a:rPr lang="en-US" b="0" i="0" dirty="0">
-                <a:solidFill>
-                  <a:srgbClr val="000000"/>
-                </a:solidFill>
-                <a:effectLst/>
-                <a:latin typeface="GT America Standard"/>
-              </a:rPr>
-              <a:t>Duany, 2008)</a:t>
-            </a:r>
-          </a:p>
-          <a:p>
-            <a:endParaRPr lang="en-US" dirty="0"/>
-          </a:p>
-          <a:p>
-            <a:r>
-              <a:rPr lang="en-US" dirty="0"/>
-              <a:t>The United States occupied the Dominican Republic twice, from 1916 to 1924 and again in 1965. Instability caused by  the fall of the Trujillo dictatorship in 1961 led to a surge of migration to the US.</a:t>
-            </a:r>
-          </a:p>
-          <a:p>
-            <a:endParaRPr lang="en-US" dirty="0"/>
-          </a:p>
-          <a:p>
-            <a:r>
-              <a:rPr lang="en-US" dirty="0"/>
-              <a:t>Cuban Revolution in 1959 sparked one of the largest refugee movement in US history (Duany 2017). Since 1966, Cubans have had a path to legal status. </a:t>
-            </a:r>
-          </a:p>
-          <a:p>
-            <a:endParaRPr lang="en-US" dirty="0"/>
-          </a:p>
-          <a:p>
-            <a:r>
-              <a:rPr lang="en-US" dirty="0"/>
-              <a:t>Mexico also had a revolution in the early 1900’s which resulted mass migration to the US. This was followed by institutionalized migration in the form of the Bracero program in the 1940’s which ended in 1964. </a:t>
-            </a:r>
-          </a:p>
-          <a:p>
-            <a:endParaRPr lang="en-US"/>
-          </a:p>
-          <a:p>
-            <a:endParaRPr lang="en-US" dirty="0"/>
-          </a:p>
-          <a:p>
-            <a:endParaRPr lang="en-US" dirty="0"/>
+              <a:t>Cuban Revolution in 1959 sparked one of the largest refugee movement in US history (Duany 2017). In 1966, given path to US residency. </a:t>
+            </a:r>
           </a:p>
         </p:txBody>
       </p:sp>
@@ -6574,35 +6505,6 @@
           </a:p>
         </p:txBody>
       </p:sp>
-      <p:pic>
-        <p:nvPicPr>
-          <p:cNvPr id="6" name="Picture 5">
-            <a:extLst>
-              <a:ext uri="{FF2B5EF4-FFF2-40B4-BE49-F238E27FC236}">
-                <a16:creationId xmlns:a16="http://schemas.microsoft.com/office/drawing/2014/main" id="{69A9CC41-5B7D-2033-49D5-27821595BB79}"/>
-              </a:ext>
-            </a:extLst>
-          </p:cNvPr>
-          <p:cNvPicPr>
-            <a:picLocks noChangeAspect="1"/>
-          </p:cNvPicPr>
-          <p:nvPr/>
-        </p:nvPicPr>
-        <p:blipFill>
-          <a:blip r:embed="rId4"/>
-          <a:srcRect/>
-          <a:stretch/>
-        </p:blipFill>
-        <p:spPr>
-          <a:xfrm>
-            <a:off x="1015186" y="1783781"/>
-            <a:ext cx="10161628" cy="5080814"/>
-          </a:xfrm>
-          <a:prstGeom prst="rect">
-            <a:avLst/>
-          </a:prstGeom>
-        </p:spPr>
-      </p:pic>
       <p:sp>
         <p:nvSpPr>
           <p:cNvPr id="7" name="TextBox 6">
@@ -6638,6 +6540,36 @@
           </a:p>
         </p:txBody>
       </p:sp>
+      <p:pic>
+        <p:nvPicPr>
+          <p:cNvPr id="5" name="Picture 4" descr="A screenshot of a graph&#10;&#10;AI-generated content may be incorrect.">
+            <a:extLst>
+              <a:ext uri="{FF2B5EF4-FFF2-40B4-BE49-F238E27FC236}">
+                <a16:creationId xmlns:a16="http://schemas.microsoft.com/office/drawing/2014/main" id="{3FCC31FF-93CD-4792-6BAA-72F29CE57DCB}"/>
+              </a:ext>
+            </a:extLst>
+          </p:cNvPr>
+          <p:cNvPicPr>
+            <a:picLocks noChangeAspect="1"/>
+          </p:cNvPicPr>
+          <p:nvPr/>
+        </p:nvPicPr>
+        <p:blipFill>
+          <a:blip r:embed="rId4"/>
+          <a:stretch>
+            <a:fillRect/>
+          </a:stretch>
+        </p:blipFill>
+        <p:spPr>
+          <a:xfrm>
+            <a:off x="1156276" y="1469212"/>
+            <a:ext cx="9879447" cy="5388788"/>
+          </a:xfrm>
+          <a:prstGeom prst="rect">
+            <a:avLst/>
+          </a:prstGeom>
+        </p:spPr>
+      </p:pic>
     </p:spTree>
     <p:extLst>
       <p:ext uri="{BB962C8B-B14F-4D97-AF65-F5344CB8AC3E}">
@@ -10037,7 +9969,12 @@
             <p:ph type="title"/>
           </p:nvPr>
         </p:nvSpPr>
-        <p:spPr/>
+        <p:spPr>
+          <a:xfrm>
+            <a:off x="838200" y="18255"/>
+            <a:ext cx="10515600" cy="1325563"/>
+          </a:xfrm>
+        </p:spPr>
         <p:txBody>
           <a:bodyPr>
             <a:normAutofit/>
@@ -10077,39 +10014,42 @@
             <a:pPr marL="0" indent="0">
               <a:buNone/>
             </a:pPr>
-            <a:r>
-              <a:rPr lang="en-US" dirty="0"/>
-              <a:t>Say these verbally</a:t>
-            </a:r>
-          </a:p>
-          <a:p>
-            <a:pPr marL="0" indent="0">
-              <a:buNone/>
-            </a:pPr>
-            <a:endParaRPr lang="en-US" dirty="0"/>
-          </a:p>
-          <a:p>
-            <a:r>
-              <a:rPr lang="en-US" dirty="0"/>
-              <a:t>Puerto Rico became a US territory in 1898. In 1917 they were granted US citizenship.</a:t>
-            </a:r>
             <a:br>
               <a:rPr lang="en-US" dirty="0"/>
             </a:br>
             <a:endParaRPr lang="en-US" dirty="0"/>
           </a:p>
-          <a:p>
-            <a:r>
-              <a:rPr lang="en-US" dirty="0"/>
-              <a:t>Cuban Revolution in 1959 sparked one of the largest refugee movement in US history (Duany 2017). In 1966, given path to US residency. </a:t>
-            </a:r>
-            <a:br>
-              <a:rPr lang="en-US" dirty="0"/>
-            </a:br>
-            <a:endParaRPr lang="en-US" dirty="0"/>
-          </a:p>
-        </p:txBody>
-      </p:sp>
+        </p:txBody>
+      </p:sp>
+      <p:pic>
+        <p:nvPicPr>
+          <p:cNvPr id="5" name="Picture 4">
+            <a:extLst>
+              <a:ext uri="{FF2B5EF4-FFF2-40B4-BE49-F238E27FC236}">
+                <a16:creationId xmlns:a16="http://schemas.microsoft.com/office/drawing/2014/main" id="{90827380-6E80-BBE5-3FE2-7C2381FEC479}"/>
+              </a:ext>
+            </a:extLst>
+          </p:cNvPr>
+          <p:cNvPicPr>
+            <a:picLocks noChangeAspect="1"/>
+          </p:cNvPicPr>
+          <p:nvPr/>
+        </p:nvPicPr>
+        <p:blipFill>
+          <a:blip r:embed="rId3"/>
+          <a:srcRect/>
+          <a:stretch/>
+        </p:blipFill>
+        <p:spPr>
+          <a:xfrm>
+            <a:off x="487680" y="1249680"/>
+            <a:ext cx="11216640" cy="5608320"/>
+          </a:xfrm>
+          <a:prstGeom prst="rect">
+            <a:avLst/>
+          </a:prstGeom>
+        </p:spPr>
+      </p:pic>
     </p:spTree>
     <p:extLst>
       <p:ext uri="{BB962C8B-B14F-4D97-AF65-F5344CB8AC3E}">
@@ -10120,11 +10060,6 @@
   <p:clrMapOvr>
     <a:masterClrMapping/>
   </p:clrMapOvr>
-  <p:extLst>
-    <p:ext uri="{6950BFC3-D8DA-4A85-94F7-54DA5524770B}">
-      <p188:commentRel xmlns:p188="http://schemas.microsoft.com/office/powerpoint/2018/8/main" r:id="rId3"/>
-    </p:ext>
-  </p:extLst>
 </p:sld>
 </file>
 
@@ -10163,7 +10098,7 @@
         </p:nvSpPr>
         <p:spPr>
           <a:xfrm>
-            <a:off x="345989" y="365125"/>
+            <a:off x="345989" y="85993"/>
             <a:ext cx="11640065" cy="1325563"/>
           </a:xfrm>
         </p:spPr>
@@ -10177,190 +10112,6 @@
               <a:rPr lang="en-US" dirty="0"/>
               <a:t>Most people migrated at working ages</a:t>
             </a:r>
-          </a:p>
-        </p:txBody>
-      </p:sp>
-      <p:pic>
-        <p:nvPicPr>
-          <p:cNvPr id="7" name="Content Placeholder 6">
-            <a:extLst>
-              <a:ext uri="{FF2B5EF4-FFF2-40B4-BE49-F238E27FC236}">
-                <a16:creationId xmlns:a16="http://schemas.microsoft.com/office/drawing/2014/main" id="{7797724C-700B-983B-79D9-21BA1047ED67}"/>
-              </a:ext>
-            </a:extLst>
-          </p:cNvPr>
-          <p:cNvPicPr>
-            <a:picLocks noGrp="1" noChangeAspect="1"/>
-          </p:cNvPicPr>
-          <p:nvPr>
-            <p:ph idx="1"/>
-          </p:nvPr>
-        </p:nvPicPr>
-        <p:blipFill>
-          <a:blip r:embed="rId4"/>
-          <a:srcRect/>
-          <a:stretch/>
-        </p:blipFill>
-        <p:spPr>
-          <a:xfrm>
-            <a:off x="697633" y="1536210"/>
-            <a:ext cx="9913330" cy="4956665"/>
-          </a:xfrm>
-        </p:spPr>
-      </p:pic>
-      <p:sp>
-        <p:nvSpPr>
-          <p:cNvPr id="16" name="Rectangle 15">
-            <a:extLst>
-              <a:ext uri="{FF2B5EF4-FFF2-40B4-BE49-F238E27FC236}">
-                <a16:creationId xmlns:a16="http://schemas.microsoft.com/office/drawing/2014/main" id="{7D2FE67C-D030-4FAC-D1E7-DAC40886B7DC}"/>
-              </a:ext>
-            </a:extLst>
-          </p:cNvPr>
-          <p:cNvSpPr/>
-          <p:nvPr/>
-        </p:nvSpPr>
-        <p:spPr>
-          <a:xfrm>
-            <a:off x="8384583" y="1604580"/>
-            <a:ext cx="2226379" cy="4888295"/>
-          </a:xfrm>
-          <a:prstGeom prst="rect">
-            <a:avLst/>
-          </a:prstGeom>
-          <a:noFill/>
-          <a:ln w="38100">
-            <a:solidFill>
-              <a:srgbClr val="FF0000"/>
-            </a:solidFill>
-          </a:ln>
-        </p:spPr>
-        <p:style>
-          <a:lnRef idx="2">
-            <a:schemeClr val="accent1">
-              <a:shade val="15000"/>
-            </a:schemeClr>
-          </a:lnRef>
-          <a:fillRef idx="1">
-            <a:schemeClr val="accent1"/>
-          </a:fillRef>
-          <a:effectRef idx="0">
-            <a:schemeClr val="accent1"/>
-          </a:effectRef>
-          <a:fontRef idx="minor">
-            <a:schemeClr val="lt1"/>
-          </a:fontRef>
-        </p:style>
-        <p:txBody>
-          <a:bodyPr rtlCol="0" anchor="ctr"/>
-          <a:lstStyle/>
-          <a:p>
-            <a:pPr algn="ctr"/>
-            <a:endParaRPr lang="en-US"/>
-          </a:p>
-        </p:txBody>
-      </p:sp>
-      <p:sp>
-        <p:nvSpPr>
-          <p:cNvPr id="17" name="Rectangle 16">
-            <a:extLst>
-              <a:ext uri="{FF2B5EF4-FFF2-40B4-BE49-F238E27FC236}">
-                <a16:creationId xmlns:a16="http://schemas.microsoft.com/office/drawing/2014/main" id="{CB555C90-C563-FBAE-4581-5E32C46EC150}"/>
-              </a:ext>
-            </a:extLst>
-          </p:cNvPr>
-          <p:cNvSpPr/>
-          <p:nvPr/>
-        </p:nvSpPr>
-        <p:spPr>
-          <a:xfrm>
-            <a:off x="2391905" y="1570394"/>
-            <a:ext cx="2226379" cy="4888295"/>
-          </a:xfrm>
-          <a:prstGeom prst="rect">
-            <a:avLst/>
-          </a:prstGeom>
-          <a:noFill/>
-          <a:ln w="38100">
-            <a:solidFill>
-              <a:srgbClr val="FF0000"/>
-            </a:solidFill>
-          </a:ln>
-        </p:spPr>
-        <p:style>
-          <a:lnRef idx="2">
-            <a:schemeClr val="accent1">
-              <a:shade val="15000"/>
-            </a:schemeClr>
-          </a:lnRef>
-          <a:fillRef idx="1">
-            <a:schemeClr val="accent1"/>
-          </a:fillRef>
-          <a:effectRef idx="0">
-            <a:schemeClr val="accent1"/>
-          </a:effectRef>
-          <a:fontRef idx="minor">
-            <a:schemeClr val="lt1"/>
-          </a:fontRef>
-        </p:style>
-        <p:txBody>
-          <a:bodyPr rtlCol="0" anchor="ctr"/>
-          <a:lstStyle/>
-          <a:p>
-            <a:pPr algn="ctr"/>
-            <a:endParaRPr lang="en-US"/>
-          </a:p>
-        </p:txBody>
-      </p:sp>
-      <p:sp>
-        <p:nvSpPr>
-          <p:cNvPr id="18" name="Rectangle 17">
-            <a:extLst>
-              <a:ext uri="{FF2B5EF4-FFF2-40B4-BE49-F238E27FC236}">
-                <a16:creationId xmlns:a16="http://schemas.microsoft.com/office/drawing/2014/main" id="{C18C43EE-18D4-5A21-4439-594DF5E07513}"/>
-              </a:ext>
-            </a:extLst>
-          </p:cNvPr>
-          <p:cNvSpPr/>
-          <p:nvPr/>
-        </p:nvSpPr>
-        <p:spPr>
-          <a:xfrm>
-            <a:off x="6158203" y="1604579"/>
-            <a:ext cx="2226379" cy="4888295"/>
-          </a:xfrm>
-          <a:prstGeom prst="rect">
-            <a:avLst/>
-          </a:prstGeom>
-          <a:noFill/>
-          <a:ln w="38100">
-            <a:solidFill>
-              <a:srgbClr val="FF0000"/>
-            </a:solidFill>
-          </a:ln>
-        </p:spPr>
-        <p:style>
-          <a:lnRef idx="2">
-            <a:schemeClr val="accent1">
-              <a:shade val="15000"/>
-            </a:schemeClr>
-          </a:lnRef>
-          <a:fillRef idx="1">
-            <a:schemeClr val="accent1"/>
-          </a:fillRef>
-          <a:effectRef idx="0">
-            <a:schemeClr val="accent1"/>
-          </a:effectRef>
-          <a:fontRef idx="minor">
-            <a:schemeClr val="lt1"/>
-          </a:fontRef>
-        </p:style>
-        <p:txBody>
-          <a:bodyPr rtlCol="0" anchor="ctr"/>
-          <a:lstStyle/>
-          <a:p>
-            <a:pPr algn="ctr"/>
-            <a:endParaRPr lang="en-US"/>
           </a:p>
         </p:txBody>
       </p:sp>
@@ -10399,7 +10150,7 @@
             <p:nvPr/>
           </p:nvPicPr>
           <p:blipFill>
-            <a:blip r:embed="rId5">
+            <a:blip r:embed="rId4">
               <a:extLst>
                 <a:ext uri="{28A0092B-C50C-407E-A947-70E740481C1C}">
                   <a14:useLocalDpi xmlns:a14="http://schemas.microsoft.com/office/drawing/2010/main" val="0"/>
@@ -10470,6 +10221,35 @@
           </p:txBody>
         </p:sp>
       </p:grpSp>
+      <p:pic>
+        <p:nvPicPr>
+          <p:cNvPr id="8" name="Picture 7">
+            <a:extLst>
+              <a:ext uri="{FF2B5EF4-FFF2-40B4-BE49-F238E27FC236}">
+                <a16:creationId xmlns:a16="http://schemas.microsoft.com/office/drawing/2014/main" id="{4497AAAA-15E1-3643-4B70-8F75550F6E48}"/>
+              </a:ext>
+            </a:extLst>
+          </p:cNvPr>
+          <p:cNvPicPr>
+            <a:picLocks noChangeAspect="1"/>
+          </p:cNvPicPr>
+          <p:nvPr/>
+        </p:nvPicPr>
+        <p:blipFill>
+          <a:blip r:embed="rId5"/>
+          <a:srcRect/>
+          <a:stretch/>
+        </p:blipFill>
+        <p:spPr>
+          <a:xfrm>
+            <a:off x="487680" y="1249680"/>
+            <a:ext cx="11216640" cy="5608320"/>
+          </a:xfrm>
+          <a:prstGeom prst="rect">
+            <a:avLst/>
+          </a:prstGeom>
+        </p:spPr>
+      </p:pic>
     </p:spTree>
     <p:extLst>
       <p:ext uri="{BB962C8B-B14F-4D97-AF65-F5344CB8AC3E}">
@@ -10480,284 +10260,6 @@
   <p:clrMapOvr>
     <a:masterClrMapping/>
   </p:clrMapOvr>
-  <p:timing>
-    <p:tnLst>
-      <p:par>
-        <p:cTn id="1" dur="indefinite" restart="never" nodeType="tmRoot">
-          <p:childTnLst>
-            <p:seq concurrent="1" nextAc="seek">
-              <p:cTn id="2" dur="indefinite" nodeType="mainSeq">
-                <p:childTnLst>
-                  <p:par>
-                    <p:cTn id="3" fill="hold">
-                      <p:stCondLst>
-                        <p:cond delay="indefinite"/>
-                      </p:stCondLst>
-                      <p:childTnLst>
-                        <p:par>
-                          <p:cTn id="4" fill="hold">
-                            <p:stCondLst>
-                              <p:cond delay="0"/>
-                            </p:stCondLst>
-                            <p:childTnLst>
-                              <p:par>
-                                <p:cTn id="5" presetID="1" presetClass="entr" presetSubtype="0" fill="hold" grpId="0" nodeType="clickEffect">
-                                  <p:stCondLst>
-                                    <p:cond delay="0"/>
-                                  </p:stCondLst>
-                                  <p:childTnLst>
-                                    <p:set>
-                                      <p:cBhvr>
-                                        <p:cTn id="6" dur="1" fill="hold">
-                                          <p:stCondLst>
-                                            <p:cond delay="0"/>
-                                          </p:stCondLst>
-                                        </p:cTn>
-                                        <p:tgtEl>
-                                          <p:spTgt spid="16"/>
-                                        </p:tgtEl>
-                                        <p:attrNameLst>
-                                          <p:attrName>style.visibility</p:attrName>
-                                        </p:attrNameLst>
-                                      </p:cBhvr>
-                                      <p:to>
-                                        <p:strVal val="visible"/>
-                                      </p:to>
-                                    </p:set>
-                                  </p:childTnLst>
-                                </p:cTn>
-                              </p:par>
-                            </p:childTnLst>
-                          </p:cTn>
-                        </p:par>
-                      </p:childTnLst>
-                    </p:cTn>
-                  </p:par>
-                  <p:par>
-                    <p:cTn id="7" fill="hold">
-                      <p:stCondLst>
-                        <p:cond delay="indefinite"/>
-                      </p:stCondLst>
-                      <p:childTnLst>
-                        <p:par>
-                          <p:cTn id="8" fill="hold">
-                            <p:stCondLst>
-                              <p:cond delay="0"/>
-                            </p:stCondLst>
-                            <p:childTnLst>
-                              <p:par>
-                                <p:cTn id="9" presetID="9" presetClass="exit" presetSubtype="0" fill="hold" grpId="1" nodeType="clickEffect">
-                                  <p:stCondLst>
-                                    <p:cond delay="0"/>
-                                  </p:stCondLst>
-                                  <p:childTnLst>
-                                    <p:animEffect transition="out" filter="dissolve">
-                                      <p:cBhvr>
-                                        <p:cTn id="10" dur="500"/>
-                                        <p:tgtEl>
-                                          <p:spTgt spid="16"/>
-                                        </p:tgtEl>
-                                      </p:cBhvr>
-                                    </p:animEffect>
-                                    <p:set>
-                                      <p:cBhvr>
-                                        <p:cTn id="11" dur="1" fill="hold">
-                                          <p:stCondLst>
-                                            <p:cond delay="499"/>
-                                          </p:stCondLst>
-                                        </p:cTn>
-                                        <p:tgtEl>
-                                          <p:spTgt spid="16"/>
-                                        </p:tgtEl>
-                                        <p:attrNameLst>
-                                          <p:attrName>style.visibility</p:attrName>
-                                        </p:attrNameLst>
-                                      </p:cBhvr>
-                                      <p:to>
-                                        <p:strVal val="hidden"/>
-                                      </p:to>
-                                    </p:set>
-                                  </p:childTnLst>
-                                </p:cTn>
-                              </p:par>
-                            </p:childTnLst>
-                          </p:cTn>
-                        </p:par>
-                      </p:childTnLst>
-                    </p:cTn>
-                  </p:par>
-                  <p:par>
-                    <p:cTn id="12" fill="hold">
-                      <p:stCondLst>
-                        <p:cond delay="indefinite"/>
-                      </p:stCondLst>
-                      <p:childTnLst>
-                        <p:par>
-                          <p:cTn id="13" fill="hold">
-                            <p:stCondLst>
-                              <p:cond delay="0"/>
-                            </p:stCondLst>
-                            <p:childTnLst>
-                              <p:par>
-                                <p:cTn id="14" presetID="1" presetClass="entr" presetSubtype="0" fill="hold" grpId="0" nodeType="clickEffect">
-                                  <p:stCondLst>
-                                    <p:cond delay="0"/>
-                                  </p:stCondLst>
-                                  <p:childTnLst>
-                                    <p:set>
-                                      <p:cBhvr>
-                                        <p:cTn id="15" dur="1" fill="hold">
-                                          <p:stCondLst>
-                                            <p:cond delay="0"/>
-                                          </p:stCondLst>
-                                        </p:cTn>
-                                        <p:tgtEl>
-                                          <p:spTgt spid="17"/>
-                                        </p:tgtEl>
-                                        <p:attrNameLst>
-                                          <p:attrName>style.visibility</p:attrName>
-                                        </p:attrNameLst>
-                                      </p:cBhvr>
-                                      <p:to>
-                                        <p:strVal val="visible"/>
-                                      </p:to>
-                                    </p:set>
-                                  </p:childTnLst>
-                                </p:cTn>
-                              </p:par>
-                            </p:childTnLst>
-                          </p:cTn>
-                        </p:par>
-                      </p:childTnLst>
-                    </p:cTn>
-                  </p:par>
-                  <p:par>
-                    <p:cTn id="16" fill="hold">
-                      <p:stCondLst>
-                        <p:cond delay="indefinite"/>
-                      </p:stCondLst>
-                      <p:childTnLst>
-                        <p:par>
-                          <p:cTn id="17" fill="hold">
-                            <p:stCondLst>
-                              <p:cond delay="0"/>
-                            </p:stCondLst>
-                            <p:childTnLst>
-                              <p:par>
-                                <p:cTn id="18" presetID="9" presetClass="exit" presetSubtype="0" fill="hold" grpId="1" nodeType="clickEffect">
-                                  <p:stCondLst>
-                                    <p:cond delay="0"/>
-                                  </p:stCondLst>
-                                  <p:childTnLst>
-                                    <p:animEffect transition="out" filter="dissolve">
-                                      <p:cBhvr>
-                                        <p:cTn id="19" dur="500"/>
-                                        <p:tgtEl>
-                                          <p:spTgt spid="17"/>
-                                        </p:tgtEl>
-                                      </p:cBhvr>
-                                    </p:animEffect>
-                                    <p:set>
-                                      <p:cBhvr>
-                                        <p:cTn id="20" dur="1" fill="hold">
-                                          <p:stCondLst>
-                                            <p:cond delay="499"/>
-                                          </p:stCondLst>
-                                        </p:cTn>
-                                        <p:tgtEl>
-                                          <p:spTgt spid="17"/>
-                                        </p:tgtEl>
-                                        <p:attrNameLst>
-                                          <p:attrName>style.visibility</p:attrName>
-                                        </p:attrNameLst>
-                                      </p:cBhvr>
-                                      <p:to>
-                                        <p:strVal val="hidden"/>
-                                      </p:to>
-                                    </p:set>
-                                  </p:childTnLst>
-                                </p:cTn>
-                              </p:par>
-                            </p:childTnLst>
-                          </p:cTn>
-                        </p:par>
-                      </p:childTnLst>
-                    </p:cTn>
-                  </p:par>
-                  <p:par>
-                    <p:cTn id="21" fill="hold">
-                      <p:stCondLst>
-                        <p:cond delay="indefinite"/>
-                      </p:stCondLst>
-                      <p:childTnLst>
-                        <p:par>
-                          <p:cTn id="22" fill="hold">
-                            <p:stCondLst>
-                              <p:cond delay="0"/>
-                            </p:stCondLst>
-                            <p:childTnLst>
-                              <p:par>
-                                <p:cTn id="23" presetID="1" presetClass="entr" presetSubtype="0" fill="hold" grpId="0" nodeType="clickEffect">
-                                  <p:stCondLst>
-                                    <p:cond delay="0"/>
-                                  </p:stCondLst>
-                                  <p:childTnLst>
-                                    <p:set>
-                                      <p:cBhvr>
-                                        <p:cTn id="24" dur="1" fill="hold">
-                                          <p:stCondLst>
-                                            <p:cond delay="0"/>
-                                          </p:stCondLst>
-                                        </p:cTn>
-                                        <p:tgtEl>
-                                          <p:spTgt spid="18"/>
-                                        </p:tgtEl>
-                                        <p:attrNameLst>
-                                          <p:attrName>style.visibility</p:attrName>
-                                        </p:attrNameLst>
-                                      </p:cBhvr>
-                                      <p:to>
-                                        <p:strVal val="visible"/>
-                                      </p:to>
-                                    </p:set>
-                                  </p:childTnLst>
-                                </p:cTn>
-                              </p:par>
-                            </p:childTnLst>
-                          </p:cTn>
-                        </p:par>
-                      </p:childTnLst>
-                    </p:cTn>
-                  </p:par>
-                </p:childTnLst>
-              </p:cTn>
-              <p:prevCondLst>
-                <p:cond evt="onPrev" delay="0">
-                  <p:tgtEl>
-                    <p:sldTgt/>
-                  </p:tgtEl>
-                </p:cond>
-              </p:prevCondLst>
-              <p:nextCondLst>
-                <p:cond evt="onNext" delay="0">
-                  <p:tgtEl>
-                    <p:sldTgt/>
-                  </p:tgtEl>
-                </p:cond>
-              </p:nextCondLst>
-            </p:seq>
-          </p:childTnLst>
-        </p:cTn>
-      </p:par>
-    </p:tnLst>
-    <p:bldLst>
-      <p:bldP spid="16" grpId="0" animBg="1"/>
-      <p:bldP spid="16" grpId="1" animBg="1"/>
-      <p:bldP spid="17" grpId="0" animBg="1"/>
-      <p:bldP spid="17" grpId="1" animBg="1"/>
-      <p:bldP spid="18" grpId="0" animBg="1"/>
-    </p:bldLst>
-  </p:timing>
   <p:extLst>
     <p:ext uri="{6950BFC3-D8DA-4A85-94F7-54DA5524770B}">
       <p188:commentRel xmlns:p188="http://schemas.microsoft.com/office/powerpoint/2018/8/main" r:id="rId3"/>

</xml_diff>

<commit_message>
updated plots and udating presentation for PAA
</commit_message>
<xml_diff>
--- a/presentation/PAA_2025.pptx
+++ b/presentation/PAA_2025.pptx
@@ -145,23 +145,45 @@
 
 <file path=ppt/comments/modernComment_101_160AA05C.xml><?xml version="1.0" encoding="utf-8"?>
 <p188:cmLst xmlns:a="http://schemas.openxmlformats.org/drawingml/2006/main" xmlns:r="http://schemas.openxmlformats.org/officeDocument/2006/relationships" xmlns:p188="http://schemas.microsoft.com/office/powerpoint/2018/8/main">
-  <p188:cm id="{01923662-F765-5649-9BD9-E37BD7B66E53}" authorId="{AFA1B2A6-432F-BDAD-8948-8605949700F2}" created="2025-04-04T17:00:47.172">
+  <p188:cm id="{87490955-8441-F444-885C-14D09A9B3C66}" authorId="{AFA1B2A6-432F-BDAD-8948-8605949700F2}" created="2025-04-09T17:24:25.921">
     <ac:txMkLst xmlns:ac="http://schemas.microsoft.com/office/drawing/2013/main/command">
       <pc:docMk xmlns:pc="http://schemas.microsoft.com/office/powerpoint/2013/main/command"/>
       <pc:sldMk xmlns:pc="http://schemas.microsoft.com/office/powerpoint/2013/main/command" cId="369795164" sldId="257"/>
       <ac:spMk id="3" creationId="{DA531385-67C5-A489-E34A-2D6E8D37FEF0}"/>
-      <ac:txMk cp="0">
-        <ac:context len="404" hash="3536195677"/>
+      <ac:txMk cp="87" len="72">
+        <ac:context len="407" hash="3965670693"/>
       </ac:txMk>
     </ac:txMkLst>
-    <p188:pos x="8849139" y="2309053"/>
+    <p188:pos x="10346356" y="1158208"/>
     <p188:txBody>
       <a:bodyPr/>
       <a:lstStyle/>
       <a:p>
         <a:r>
           <a:rPr lang="en-US"/>
-          <a:t>Animate in the points as you speak about them</a:t>
+          <a:t>Look for the specific citation to have in handy</a:t>
+        </a:r>
+      </a:p>
+    </p188:txBody>
+  </p188:cm>
+</p188:cmLst>
+</file>
+
+<file path=ppt/comments/modernComment_104_F3442793.xml><?xml version="1.0" encoding="utf-8"?>
+<p188:cmLst xmlns:a="http://schemas.openxmlformats.org/drawingml/2006/main" xmlns:r="http://schemas.openxmlformats.org/officeDocument/2006/relationships" xmlns:p188="http://schemas.microsoft.com/office/powerpoint/2018/8/main">
+  <p188:cm id="{2766AD07-B150-6449-9FE7-997F7C4E4519}" authorId="{AFA1B2A6-432F-BDAD-8948-8605949700F2}" created="2025-04-09T17:05:39.368">
+    <ac:deMkLst xmlns:ac="http://schemas.microsoft.com/office/drawing/2013/main/command">
+      <pc:docMk xmlns:pc="http://schemas.microsoft.com/office/powerpoint/2013/main/command"/>
+      <pc:sldMk xmlns:pc="http://schemas.microsoft.com/office/powerpoint/2013/main/command" cId="4081330067" sldId="260"/>
+      <ac:picMk id="7" creationId="{3BC4F2D5-3076-696E-92CA-1261689E7432}"/>
+    </ac:deMkLst>
+    <p188:txBody>
+      <a:bodyPr/>
+      <a:lstStyle/>
+      <a:p>
+        <a:r>
+          <a:rPr lang="en-US"/>
+          <a:t>Change legend so that order is consistent with other plots</a:t>
         </a:r>
       </a:p>
     </p188:txBody>
@@ -184,6 +206,28 @@
         <a:r>
           <a:rPr lang="en-US"/>
           <a:t>Two bars for country right next to each other</a:t>
+        </a:r>
+      </a:p>
+    </p188:txBody>
+  </p188:cm>
+</p188:cmLst>
+</file>
+
+<file path=ppt/comments/modernComment_117_3CE6AC4A.xml><?xml version="1.0" encoding="utf-8"?>
+<p188:cmLst xmlns:a="http://schemas.openxmlformats.org/drawingml/2006/main" xmlns:r="http://schemas.openxmlformats.org/officeDocument/2006/relationships" xmlns:p188="http://schemas.microsoft.com/office/powerpoint/2018/8/main">
+  <p188:cm id="{80B5E051-04BE-F34A-ACB4-3439CE548953}" authorId="{AFA1B2A6-432F-BDAD-8948-8605949700F2}" created="2025-04-09T16:46:38.798">
+    <ac:deMkLst xmlns:ac="http://schemas.microsoft.com/office/drawing/2013/main/command">
+      <pc:docMk xmlns:pc="http://schemas.microsoft.com/office/powerpoint/2013/main/command"/>
+      <pc:sldMk xmlns:pc="http://schemas.microsoft.com/office/powerpoint/2013/main/command" cId="1021750346" sldId="279"/>
+      <ac:picMk id="5" creationId="{29F97403-C0CE-B640-F61A-FFF0CA2E81B7}"/>
+    </ac:deMkLst>
+    <p188:txBody>
+      <a:bodyPr/>
+      <a:lstStyle/>
+      <a:p>
+        <a:r>
+          <a:rPr lang="en-US"/>
+          <a:t>Change to make same color as other plots</a:t>
         </a:r>
       </a:p>
     </p188:txBody>
@@ -584,16 +628,38 @@
           <a:bodyPr/>
           <a:lstStyle/>
           <a:p>
+            <a:r>
+              <a:rPr lang="en-US" dirty="0"/>
+              <a:t>Introduce self…</a:t>
+            </a:r>
+          </a:p>
+          <a:p>
             <a:endParaRPr lang="en-US" dirty="0"/>
           </a:p>
           <a:p>
+            <a:r>
+              <a:rPr lang="en-US" b="0" i="0" dirty="0">
+                <a:effectLst/>
+                <a:latin typeface="fkGroteskNeue"/>
+              </a:rPr>
+              <a:t>Today I'm going to present research in collaboration with William and Henry Dow on sociodemographic heterogeneity among older Hispanic adults in the United States, with a particular focus on comparing immigrants from different countries of origin.</a:t>
+            </a:r>
+          </a:p>
+          <a:p>
+            <a:endParaRPr lang="en-US" b="0" i="0" dirty="0">
+              <a:effectLst/>
+              <a:latin typeface="fkGroteskNeue"/>
+            </a:endParaRPr>
+          </a:p>
+          <a:p>
+            <a:r>
+              <a:rPr lang="en-US" b="0" i="0" dirty="0">
+                <a:effectLst/>
+                <a:latin typeface="fkGroteskNeue"/>
+              </a:rPr>
+              <a:t>Our goal is to highlight that these Hispanic migrant groups are different enough from each other to deserve their own spotlight in research and policy discussions.</a:t>
+            </a:r>
             <a:endParaRPr lang="en-US" dirty="0"/>
-          </a:p>
-          <a:p>
-            <a:r>
-              <a:rPr lang="en-US" dirty="0"/>
-              <a:t>However, a lot of the research on Hispanic migrant health is focused on Mexicans, in part because they are such a large segment of the migrant population. In fact, Mexican immigrants are about 44% of the Hispanic migrant population. However, Hispanic Caribbean migrants are also a large group, and together make just about 30% of the Hispanic migrants. </a:t>
-            </a:r>
           </a:p>
         </p:txBody>
       </p:sp>
@@ -614,7 +680,7 @@
           <a:p>
             <a:fld id="{6ADC826D-AAF9-3849-8641-F0AC1F9103F6}" type="slidenum">
               <a:rPr lang="en-US" smtClean="0"/>
-              <a:t>2</a:t>
+              <a:t>1</a:t>
             </a:fld>
             <a:endParaRPr lang="en-US"/>
           </a:p>
@@ -623,7 +689,7 @@
     </p:spTree>
     <p:extLst>
       <p:ext uri="{BB962C8B-B14F-4D97-AF65-F5344CB8AC3E}">
-        <p14:creationId xmlns:p14="http://schemas.microsoft.com/office/powerpoint/2010/main" val="217471622"/>
+        <p14:creationId xmlns:p14="http://schemas.microsoft.com/office/powerpoint/2010/main" val="909173233"/>
       </p:ext>
     </p:extLst>
   </p:cSld>
@@ -679,34 +745,7 @@
           <a:p>
             <a:r>
               <a:rPr lang="en-US" dirty="0"/>
-              <a:t>Here, I’m going to combine the previously shown education bars with bars bars of people only age 24 and above</a:t>
-            </a:r>
-          </a:p>
-          <a:p>
-            <a:endParaRPr lang="en-US" dirty="0"/>
-          </a:p>
-          <a:p>
-            <a:r>
-              <a:rPr lang="en-US" dirty="0"/>
-              <a:t>Education difference remains among those migrants who migrated after age 24 (also robust to regression controls)</a:t>
-            </a:r>
-          </a:p>
-          <a:p>
-            <a:endParaRPr lang="en-US" dirty="0"/>
-          </a:p>
-          <a:p>
-            <a:r>
-              <a:rPr lang="en-US" dirty="0"/>
-              <a:t>It’s not that certain groups are arriving at younger ages that explains the relationship</a:t>
-            </a:r>
-          </a:p>
-          <a:p>
-            <a:endParaRPr lang="en-US" dirty="0"/>
-          </a:p>
-          <a:p>
-            <a:r>
-              <a:rPr lang="en-US" dirty="0"/>
-              <a:t>Subtitle to the graph, results are changes when controlling </a:t>
+              <a:t>All of these are statistically significant </a:t>
             </a:r>
           </a:p>
         </p:txBody>
@@ -728,7 +767,7 @@
           <a:p>
             <a:fld id="{6ADC826D-AAF9-3849-8641-F0AC1F9103F6}" type="slidenum">
               <a:rPr lang="en-US" smtClean="0"/>
-              <a:t>11</a:t>
+              <a:t>10</a:t>
             </a:fld>
             <a:endParaRPr lang="en-US"/>
           </a:p>
@@ -737,7 +776,7 @@
     </p:spTree>
     <p:extLst>
       <p:ext uri="{BB962C8B-B14F-4D97-AF65-F5344CB8AC3E}">
-        <p14:creationId xmlns:p14="http://schemas.microsoft.com/office/powerpoint/2010/main" val="2819453133"/>
+        <p14:creationId xmlns:p14="http://schemas.microsoft.com/office/powerpoint/2010/main" val="3303427139"/>
       </p:ext>
     </p:extLst>
   </p:cSld>
@@ -793,13 +832,7 @@
           <a:p>
             <a:r>
               <a:rPr lang="en-US" dirty="0"/>
-              <a:t>In the less than primary DR is the most selective</a:t>
-            </a:r>
-          </a:p>
-          <a:p>
-            <a:r>
-              <a:rPr lang="en-US" dirty="0"/>
-              <a:t>Looking at secondary, CU is bigger selection</a:t>
+              <a:t>Here, I’m going to combine the previously shown education bars with bars bars of people only age 24 and above</a:t>
             </a:r>
           </a:p>
           <a:p>
@@ -808,37 +841,25 @@
           <a:p>
             <a:r>
               <a:rPr lang="en-US" dirty="0"/>
-              <a:t>1 Mexicans in Mexica have lower education</a:t>
-            </a:r>
-          </a:p>
-          <a:p>
-            <a:r>
-              <a:rPr lang="en-US" dirty="0"/>
-              <a:t>2. But Dominicans have lower education in their home country </a:t>
-            </a:r>
-          </a:p>
-          <a:p>
-            <a:r>
-              <a:rPr lang="en-US" dirty="0"/>
-              <a:t>3. Dominican migrants have more education than Mexican Migrants</a:t>
-            </a:r>
-          </a:p>
-          <a:p>
-            <a:r>
-              <a:rPr lang="en-US" dirty="0"/>
-              <a:t>4. Therefore education selectivity varies hugely across countries </a:t>
-            </a:r>
-          </a:p>
-          <a:p>
-            <a:r>
-              <a:rPr lang="en-US" dirty="0"/>
-              <a:t>5. Same thing about Cuba</a:t>
-            </a:r>
-          </a:p>
-          <a:p>
-            <a:r>
-              <a:rPr lang="en-US" dirty="0"/>
-              <a:t>6. Puerto Rico is opposite </a:t>
+              <a:t>Education difference remains among those migrants who migrated after age 24 (also robust to regression controls)</a:t>
+            </a:r>
+          </a:p>
+          <a:p>
+            <a:endParaRPr lang="en-US" dirty="0"/>
+          </a:p>
+          <a:p>
+            <a:r>
+              <a:rPr lang="en-US" dirty="0"/>
+              <a:t>It’s not that certain groups are arriving at younger ages that explains the relationship</a:t>
+            </a:r>
+          </a:p>
+          <a:p>
+            <a:endParaRPr lang="en-US" dirty="0"/>
+          </a:p>
+          <a:p>
+            <a:r>
+              <a:rPr lang="en-US" dirty="0"/>
+              <a:t>Subtitle to the graph, results are changes when controlling </a:t>
             </a:r>
           </a:p>
         </p:txBody>
@@ -860,7 +881,7 @@
           <a:p>
             <a:fld id="{6ADC826D-AAF9-3849-8641-F0AC1F9103F6}" type="slidenum">
               <a:rPr lang="en-US" smtClean="0"/>
-              <a:t>12</a:t>
+              <a:t>11</a:t>
             </a:fld>
             <a:endParaRPr lang="en-US"/>
           </a:p>
@@ -869,7 +890,7 @@
     </p:spTree>
     <p:extLst>
       <p:ext uri="{BB962C8B-B14F-4D97-AF65-F5344CB8AC3E}">
-        <p14:creationId xmlns:p14="http://schemas.microsoft.com/office/powerpoint/2010/main" val="3406478627"/>
+        <p14:creationId xmlns:p14="http://schemas.microsoft.com/office/powerpoint/2010/main" val="2819453133"/>
       </p:ext>
     </p:extLst>
   </p:cSld>
@@ -925,7 +946,13 @@
           <a:p>
             <a:r>
               <a:rPr lang="en-US" dirty="0"/>
-              <a:t>I don’t have time to walk through hypotheses on all these factors</a:t>
+              <a:t>In the less than primary DR is the most selective</a:t>
+            </a:r>
+          </a:p>
+          <a:p>
+            <a:r>
+              <a:rPr lang="en-US" dirty="0"/>
+              <a:t>Looking at secondary, CU is bigger selection</a:t>
             </a:r>
           </a:p>
           <a:p>
@@ -934,25 +961,37 @@
           <a:p>
             <a:r>
               <a:rPr lang="en-US" dirty="0"/>
-              <a:t>When it comes to household composition, Mexican migrants again stand out compared to Caribbean migrants.</a:t>
-            </a:r>
-          </a:p>
-          <a:p>
-            <a:endParaRPr lang="en-US" dirty="0"/>
-          </a:p>
-          <a:p>
-            <a:r>
-              <a:rPr lang="en-US" dirty="0"/>
-              <a:t>Only 16% of Mexican migrants above the age of 60 live alone. For comparison, Puerto Ricans are twice as likely to live alone.</a:t>
-            </a:r>
-          </a:p>
-          <a:p>
-            <a:endParaRPr lang="en-US" dirty="0"/>
-          </a:p>
-          <a:p>
-            <a:r>
-              <a:rPr lang="en-US" dirty="0"/>
-              <a:t>And a similar pattern shows for proportion married. The majority of Mexican migrants report being married, which is less common amongst the Caribbean migrants. </a:t>
+              <a:t>1 Mexicans in Mexica have lower education</a:t>
+            </a:r>
+          </a:p>
+          <a:p>
+            <a:r>
+              <a:rPr lang="en-US" dirty="0"/>
+              <a:t>2. But Dominicans have lower education in their home country </a:t>
+            </a:r>
+          </a:p>
+          <a:p>
+            <a:r>
+              <a:rPr lang="en-US" dirty="0"/>
+              <a:t>3. Dominican migrants have more education than Mexican Migrants</a:t>
+            </a:r>
+          </a:p>
+          <a:p>
+            <a:r>
+              <a:rPr lang="en-US" dirty="0"/>
+              <a:t>4. Therefore education selectivity varies hugely across countries </a:t>
+            </a:r>
+          </a:p>
+          <a:p>
+            <a:r>
+              <a:rPr lang="en-US" dirty="0"/>
+              <a:t>5. Same thing about Cuba</a:t>
+            </a:r>
+          </a:p>
+          <a:p>
+            <a:r>
+              <a:rPr lang="en-US" dirty="0"/>
+              <a:t>6. Puerto Rico is opposite </a:t>
             </a:r>
           </a:p>
         </p:txBody>
@@ -974,7 +1013,7 @@
           <a:p>
             <a:fld id="{6ADC826D-AAF9-3849-8641-F0AC1F9103F6}" type="slidenum">
               <a:rPr lang="en-US" smtClean="0"/>
-              <a:t>13</a:t>
+              <a:t>12</a:t>
             </a:fld>
             <a:endParaRPr lang="en-US"/>
           </a:p>
@@ -983,7 +1022,7 @@
     </p:spTree>
     <p:extLst>
       <p:ext uri="{BB962C8B-B14F-4D97-AF65-F5344CB8AC3E}">
-        <p14:creationId xmlns:p14="http://schemas.microsoft.com/office/powerpoint/2010/main" val="2705217225"/>
+        <p14:creationId xmlns:p14="http://schemas.microsoft.com/office/powerpoint/2010/main" val="3406478627"/>
       </p:ext>
     </p:extLst>
   </p:cSld>
@@ -1039,7 +1078,7 @@
           <a:p>
             <a:r>
               <a:rPr lang="en-US" dirty="0"/>
-              <a:t>Again, the biggest difference here is between Dominicans and Cubans</a:t>
+              <a:t>I don’t have time to walk through hypotheses on all these factors</a:t>
             </a:r>
           </a:p>
           <a:p>
@@ -1048,7 +1087,25 @@
           <a:p>
             <a:r>
               <a:rPr lang="en-US" dirty="0"/>
-              <a:t>These are averages for men and women combined, if we look at women separately we see they’re more likely to live alone, but the overall pattern is the same</a:t>
+              <a:t>When it comes to household composition, Mexican migrants again stand out compared to Caribbean migrants.</a:t>
+            </a:r>
+          </a:p>
+          <a:p>
+            <a:endParaRPr lang="en-US" dirty="0"/>
+          </a:p>
+          <a:p>
+            <a:r>
+              <a:rPr lang="en-US" dirty="0"/>
+              <a:t>Only 16% of Mexican migrants above the age of 60 live alone. For comparison, Puerto Ricans are twice as likely to live alone.</a:t>
+            </a:r>
+          </a:p>
+          <a:p>
+            <a:endParaRPr lang="en-US" dirty="0"/>
+          </a:p>
+          <a:p>
+            <a:r>
+              <a:rPr lang="en-US" dirty="0"/>
+              <a:t>And a similar pattern shows for proportion married. The majority of Mexican migrants report being married, which is less common amongst the Caribbean migrants. </a:t>
             </a:r>
           </a:p>
         </p:txBody>
@@ -1070,7 +1127,7 @@
           <a:p>
             <a:fld id="{6ADC826D-AAF9-3849-8641-F0AC1F9103F6}" type="slidenum">
               <a:rPr lang="en-US" smtClean="0"/>
-              <a:t>14</a:t>
+              <a:t>13</a:t>
             </a:fld>
             <a:endParaRPr lang="en-US"/>
           </a:p>
@@ -1079,7 +1136,7 @@
     </p:spTree>
     <p:extLst>
       <p:ext uri="{BB962C8B-B14F-4D97-AF65-F5344CB8AC3E}">
-        <p14:creationId xmlns:p14="http://schemas.microsoft.com/office/powerpoint/2010/main" val="2363512581"/>
+        <p14:creationId xmlns:p14="http://schemas.microsoft.com/office/powerpoint/2010/main" val="2705217225"/>
       </p:ext>
     </p:extLst>
   </p:cSld>
@@ -1135,7 +1192,7 @@
           <a:p>
             <a:r>
               <a:rPr lang="en-US" dirty="0"/>
-              <a:t>Last there’s marriage and whether people are more likely to live with a partner. </a:t>
+              <a:t>Again, the biggest difference here is between Dominicans and Cubans</a:t>
             </a:r>
           </a:p>
           <a:p>
@@ -1144,7 +1201,7 @@
           <a:p>
             <a:r>
               <a:rPr lang="en-US" dirty="0"/>
-              <a:t>Again, the biggest difference is between Dominican migrants in the US compared to Dominicans still residing in their country. </a:t>
+              <a:t>These are averages for men and women combined, if we look at women separately we see they’re more likely to live alone, but the overall pattern is the same</a:t>
             </a:r>
           </a:p>
         </p:txBody>
@@ -1166,7 +1223,7 @@
           <a:p>
             <a:fld id="{6ADC826D-AAF9-3849-8641-F0AC1F9103F6}" type="slidenum">
               <a:rPr lang="en-US" smtClean="0"/>
-              <a:t>15</a:t>
+              <a:t>14</a:t>
             </a:fld>
             <a:endParaRPr lang="en-US"/>
           </a:p>
@@ -1175,7 +1232,7 @@
     </p:spTree>
     <p:extLst>
       <p:ext uri="{BB962C8B-B14F-4D97-AF65-F5344CB8AC3E}">
-        <p14:creationId xmlns:p14="http://schemas.microsoft.com/office/powerpoint/2010/main" val="1870954806"/>
+        <p14:creationId xmlns:p14="http://schemas.microsoft.com/office/powerpoint/2010/main" val="2363512581"/>
       </p:ext>
     </p:extLst>
   </p:cSld>
@@ -1231,19 +1288,7 @@
           <a:p>
             <a:r>
               <a:rPr lang="en-US" dirty="0"/>
-              <a:t>Caribbean Hispanics very different migration patterns</a:t>
-            </a:r>
-          </a:p>
-          <a:p>
-            <a:r>
-              <a:rPr lang="en-US" dirty="0"/>
-              <a:t>Different Education and Social Isolation Patterns</a:t>
-            </a:r>
-          </a:p>
-          <a:p>
-            <a:r>
-              <a:rPr lang="en-US" dirty="0"/>
-              <a:t>Different Selectivity on Education Patterns</a:t>
+              <a:t>Last there’s marriage and whether people are more likely to live with a partner. </a:t>
             </a:r>
           </a:p>
           <a:p>
@@ -1252,55 +1297,8 @@
           <a:p>
             <a:r>
               <a:rPr lang="en-US" dirty="0"/>
-              <a:t>Implication is that we need to acknowledge these as separate groups because we would expect immigrant health to be very different</a:t>
-            </a:r>
-          </a:p>
-          <a:p>
-            <a:endParaRPr lang="en-US" dirty="0"/>
-          </a:p>
-          <a:p>
-            <a:r>
-              <a:rPr lang="en-US" dirty="0"/>
-              <a:t>The next step is to analyze a nationally representative sample that combines both these very important sociodemographic </a:t>
-            </a:r>
-          </a:p>
-          <a:p>
-            <a:endParaRPr lang="en-US" dirty="0"/>
-          </a:p>
-          <a:p>
-            <a:r>
-              <a:rPr lang="en-US" dirty="0"/>
-              <a:t>MHAS (Mexican Healthy Aging Survey)</a:t>
-            </a:r>
-          </a:p>
-          <a:p>
-            <a:endParaRPr lang="en-US" dirty="0"/>
-          </a:p>
-          <a:p>
-            <a:pPr marL="0" marR="0" lvl="0" indent="0" algn="l" defTabSz="914400" rtl="0" eaLnBrk="1" fontAlgn="auto" latinLnBrk="0" hangingPunct="1">
-              <a:lnSpc>
-                <a:spcPct val="100000"/>
-              </a:lnSpc>
-              <a:spcBef>
-                <a:spcPts val="0"/>
-              </a:spcBef>
-              <a:spcAft>
-                <a:spcPts val="0"/>
-              </a:spcAft>
-              <a:buClrTx/>
-              <a:buSzTx/>
-              <a:buFontTx/>
-              <a:buNone/>
-              <a:tabLst/>
-              <a:defRPr/>
-            </a:pPr>
-            <a:r>
-              <a:rPr lang="en-US" dirty="0"/>
-              <a:t>7. If education is this selective, then probably big selection on </a:t>
-            </a:r>
-          </a:p>
-          <a:p>
-            <a:endParaRPr lang="en-US" dirty="0"/>
+              <a:t>Again, the biggest difference is between Dominican migrants in the US compared to Dominicans still residing in their country. </a:t>
+            </a:r>
           </a:p>
         </p:txBody>
       </p:sp>
@@ -1321,7 +1319,7 @@
           <a:p>
             <a:fld id="{6ADC826D-AAF9-3849-8641-F0AC1F9103F6}" type="slidenum">
               <a:rPr lang="en-US" smtClean="0"/>
-              <a:t>16</a:t>
+              <a:t>15</a:t>
             </a:fld>
             <a:endParaRPr lang="en-US"/>
           </a:p>
@@ -1330,7 +1328,7 @@
     </p:spTree>
     <p:extLst>
       <p:ext uri="{BB962C8B-B14F-4D97-AF65-F5344CB8AC3E}">
-        <p14:creationId xmlns:p14="http://schemas.microsoft.com/office/powerpoint/2010/main" val="4199339182"/>
+        <p14:creationId xmlns:p14="http://schemas.microsoft.com/office/powerpoint/2010/main" val="1870954806"/>
       </p:ext>
     </p:extLst>
   </p:cSld>
@@ -1386,7 +1384,19 @@
           <a:p>
             <a:r>
               <a:rPr lang="en-US" dirty="0"/>
-              <a:t>Furthermore, Things are rapidly changing. When we compare these migrant groups in 2010 to 2020, we generally see that they’re becoming more educated. </a:t>
+              <a:t>Caribbean Hispanics very different migration patterns</a:t>
+            </a:r>
+          </a:p>
+          <a:p>
+            <a:r>
+              <a:rPr lang="en-US" dirty="0"/>
+              <a:t>Different Education and Social Isolation Patterns</a:t>
+            </a:r>
+          </a:p>
+          <a:p>
+            <a:r>
+              <a:rPr lang="en-US" dirty="0"/>
+              <a:t>Different Selectivity on Education Patterns</a:t>
             </a:r>
           </a:p>
           <a:p>
@@ -1395,7 +1405,7 @@
           <a:p>
             <a:r>
               <a:rPr lang="en-US" dirty="0"/>
-              <a:t>Again, this matters because education is such a strong predictor of dementia</a:t>
+              <a:t>Implication is that we need to acknowledge these as separate groups because we would expect immigrant health to be very different</a:t>
             </a:r>
           </a:p>
           <a:p>
@@ -1404,7 +1414,7 @@
           <a:p>
             <a:r>
               <a:rPr lang="en-US" dirty="0"/>
-              <a:t>This implies that studies that use data that’s not up to date might not reflect the true state of current migrant health given how quickly things are changing </a:t>
+              <a:t>The next step is to analyze a nationally representative sample that combines both these very important sociodemographic </a:t>
             </a:r>
           </a:p>
           <a:p>
@@ -1413,8 +1423,37 @@
           <a:p>
             <a:r>
               <a:rPr lang="en-US" dirty="0"/>
-              <a:t>In other words, if we want to understand the migrant population, we need current data not just on migrants but also on their native country resident counterparts</a:t>
-            </a:r>
+              <a:t>MHAS (Mexican Healthy Aging Survey)</a:t>
+            </a:r>
+          </a:p>
+          <a:p>
+            <a:endParaRPr lang="en-US" dirty="0"/>
+          </a:p>
+          <a:p>
+            <a:pPr marL="0" marR="0" lvl="0" indent="0" algn="l" defTabSz="914400" rtl="0" eaLnBrk="1" fontAlgn="auto" latinLnBrk="0" hangingPunct="1">
+              <a:lnSpc>
+                <a:spcPct val="100000"/>
+              </a:lnSpc>
+              <a:spcBef>
+                <a:spcPts val="0"/>
+              </a:spcBef>
+              <a:spcAft>
+                <a:spcPts val="0"/>
+              </a:spcAft>
+              <a:buClrTx/>
+              <a:buSzTx/>
+              <a:buFontTx/>
+              <a:buNone/>
+              <a:tabLst/>
+              <a:defRPr/>
+            </a:pPr>
+            <a:r>
+              <a:rPr lang="en-US" dirty="0"/>
+              <a:t>7. If education is this selective, then probably big selection on </a:t>
+            </a:r>
+          </a:p>
+          <a:p>
+            <a:endParaRPr lang="en-US" dirty="0"/>
           </a:p>
         </p:txBody>
       </p:sp>
@@ -1435,7 +1474,7 @@
           <a:p>
             <a:fld id="{6ADC826D-AAF9-3849-8641-F0AC1F9103F6}" type="slidenum">
               <a:rPr lang="en-US" smtClean="0"/>
-              <a:t>17</a:t>
+              <a:t>16</a:t>
             </a:fld>
             <a:endParaRPr lang="en-US"/>
           </a:p>
@@ -1444,7 +1483,7 @@
     </p:spTree>
     <p:extLst>
       <p:ext uri="{BB962C8B-B14F-4D97-AF65-F5344CB8AC3E}">
-        <p14:creationId xmlns:p14="http://schemas.microsoft.com/office/powerpoint/2010/main" val="1885095810"/>
+        <p14:creationId xmlns:p14="http://schemas.microsoft.com/office/powerpoint/2010/main" val="4199339182"/>
       </p:ext>
     </p:extLst>
   </p:cSld>
@@ -1498,18 +1537,9 @@
           <a:bodyPr/>
           <a:lstStyle/>
           <a:p>
-            <a:pPr algn="l">
-              <a:spcAft>
-                <a:spcPts val="225"/>
-              </a:spcAft>
-            </a:pPr>
-            <a:r>
-              <a:rPr lang="en-US" b="0" i="0" u="sng" dirty="0">
-                <a:effectLst/>
-                <a:latin typeface="Roboto" panose="02000000000000000000" pitchFamily="2" charset="0"/>
-                <a:hlinkClick r:id="rId3"/>
-              </a:rPr>
-              <a:t>HCAP Network | Harmonized Cognitive Assessment Protocol</a:t>
+            <a:r>
+              <a:rPr lang="en-US" dirty="0"/>
+              <a:t>Furthermore, Things are rapidly changing. When we compare these migrant groups in 2010 to 2020, we generally see that they’re becoming more educated. </a:t>
             </a:r>
           </a:p>
           <a:p>
@@ -1518,13 +1548,25 @@
           <a:p>
             <a:r>
               <a:rPr lang="en-US" dirty="0"/>
-              <a:t>Information on return migration</a:t>
-            </a:r>
-          </a:p>
-          <a:p>
-            <a:r>
-              <a:rPr lang="en-US" dirty="0"/>
-              <a:t>We don’t have information on health (in a nationally representative) </a:t>
+              <a:t>Again, this matters because education is such a strong predictor of dementia</a:t>
+            </a:r>
+          </a:p>
+          <a:p>
+            <a:endParaRPr lang="en-US" dirty="0"/>
+          </a:p>
+          <a:p>
+            <a:r>
+              <a:rPr lang="en-US" dirty="0"/>
+              <a:t>This implies that studies that use data that’s not up to date might not reflect the true state of current migrant health given how quickly things are changing </a:t>
+            </a:r>
+          </a:p>
+          <a:p>
+            <a:endParaRPr lang="en-US" dirty="0"/>
+          </a:p>
+          <a:p>
+            <a:r>
+              <a:rPr lang="en-US" dirty="0"/>
+              <a:t>In other words, if we want to understand the migrant population, we need current data not just on migrants but also on their native country resident counterparts</a:t>
             </a:r>
           </a:p>
         </p:txBody>
@@ -1546,7 +1588,7 @@
           <a:p>
             <a:fld id="{6ADC826D-AAF9-3849-8641-F0AC1F9103F6}" type="slidenum">
               <a:rPr lang="en-US" smtClean="0"/>
-              <a:t>19</a:t>
+              <a:t>17</a:t>
             </a:fld>
             <a:endParaRPr lang="en-US"/>
           </a:p>
@@ -1555,7 +1597,7 @@
     </p:spTree>
     <p:extLst>
       <p:ext uri="{BB962C8B-B14F-4D97-AF65-F5344CB8AC3E}">
-        <p14:creationId xmlns:p14="http://schemas.microsoft.com/office/powerpoint/2010/main" val="1490383593"/>
+        <p14:creationId xmlns:p14="http://schemas.microsoft.com/office/powerpoint/2010/main" val="1885095810"/>
       </p:ext>
     </p:extLst>
   </p:cSld>
@@ -1609,56 +1651,33 @@
           <a:bodyPr/>
           <a:lstStyle/>
           <a:p>
-            <a:r>
-              <a:rPr lang="en-US" dirty="0"/>
-              <a:t>That leads us to our research questions in this paper, which is entirely descriptive. </a:t>
+            <a:pPr algn="l">
+              <a:spcAft>
+                <a:spcPts val="225"/>
+              </a:spcAft>
+            </a:pPr>
+            <a:r>
+              <a:rPr lang="en-US" b="0" i="0" u="sng" dirty="0">
+                <a:effectLst/>
+                <a:latin typeface="Roboto" panose="02000000000000000000" pitchFamily="2" charset="0"/>
+                <a:hlinkClick r:id="rId3"/>
+              </a:rPr>
+              <a:t>HCAP Network | Harmonized Cognitive Assessment Protocol</a:t>
             </a:r>
           </a:p>
           <a:p>
             <a:endParaRPr lang="en-US" dirty="0"/>
           </a:p>
           <a:p>
-            <a:pPr marL="0" marR="0" lvl="0" indent="0" algn="l" defTabSz="914400" rtl="0" eaLnBrk="1" fontAlgn="auto" latinLnBrk="0" hangingPunct="1">
-              <a:lnSpc>
-                <a:spcPct val="100000"/>
-              </a:lnSpc>
-              <a:spcBef>
-                <a:spcPts val="0"/>
-              </a:spcBef>
-              <a:spcAft>
-                <a:spcPts val="0"/>
-              </a:spcAft>
-              <a:buClrTx/>
-              <a:buSzTx/>
-              <a:buFontTx/>
-              <a:buNone/>
-              <a:tabLst/>
-              <a:defRPr/>
-            </a:pPr>
-            <a:r>
-              <a:rPr lang="en-US" dirty="0"/>
-              <a:t>1. US Immigrants from Mexico compared to those from the Hispanic Caribbean (60+)</a:t>
-            </a:r>
-          </a:p>
-          <a:p>
-            <a:r>
-              <a:rPr lang="en-US" dirty="0"/>
-              <a:t>2. We wanted to compare these movers to their home country stayers to get a better sense of the selection mechanisms at play</a:t>
-            </a:r>
-          </a:p>
-          <a:p>
-            <a:r>
-              <a:rPr lang="en-US" dirty="0"/>
-              <a:t>3. Lastly, we wanted to see how these selection patterns are changing over time</a:t>
-            </a:r>
-          </a:p>
-          <a:p>
-            <a:endParaRPr lang="en-US" dirty="0"/>
-          </a:p>
-          <a:p>
-            <a:r>
-              <a:rPr lang="en-US" dirty="0"/>
-              <a:t>We’re going to compare these migrants from Mexico those those from Puerto Rico, the Dominican Republic, and Cuba.</a:t>
+            <a:r>
+              <a:rPr lang="en-US" dirty="0"/>
+              <a:t>Information on return migration</a:t>
+            </a:r>
+          </a:p>
+          <a:p>
+            <a:r>
+              <a:rPr lang="en-US" dirty="0"/>
+              <a:t>We don’t have information on health (in a nationally representative) </a:t>
             </a:r>
           </a:p>
         </p:txBody>
@@ -1680,7 +1699,7 @@
           <a:p>
             <a:fld id="{6ADC826D-AAF9-3849-8641-F0AC1F9103F6}" type="slidenum">
               <a:rPr lang="en-US" smtClean="0"/>
-              <a:t>21</a:t>
+              <a:t>19</a:t>
             </a:fld>
             <a:endParaRPr lang="en-US"/>
           </a:p>
@@ -1689,7 +1708,7 @@
     </p:spTree>
     <p:extLst>
       <p:ext uri="{BB962C8B-B14F-4D97-AF65-F5344CB8AC3E}">
-        <p14:creationId xmlns:p14="http://schemas.microsoft.com/office/powerpoint/2010/main" val="3372543243"/>
+        <p14:creationId xmlns:p14="http://schemas.microsoft.com/office/powerpoint/2010/main" val="1490383593"/>
       </p:ext>
     </p:extLst>
   </p:cSld>
@@ -1745,20 +1764,55 @@
           <a:p>
             <a:r>
               <a:rPr lang="en-US" dirty="0"/>
-              <a:t>Research that DOES focus on differences within Hispanic groups finds important differences. </a:t>
+              <a:t>That leads us to our research questions in this paper, which is entirely descriptive. </a:t>
             </a:r>
           </a:p>
           <a:p>
             <a:endParaRPr lang="en-US" dirty="0"/>
           </a:p>
           <a:p>
-            <a:r>
-              <a:rPr lang="en-US" dirty="0"/>
-              <a:t>Here we I’m showing data from the 10/66 study (which is not nationally representative and tends to skew towards urban residents), which finds that Hispanics in the Caribbean have generally higher rates of dementia despite having relatively higher life expectancies</a:t>
+            <a:pPr marL="0" marR="0" lvl="0" indent="0" algn="l" defTabSz="914400" rtl="0" eaLnBrk="1" fontAlgn="auto" latinLnBrk="0" hangingPunct="1">
+              <a:lnSpc>
+                <a:spcPct val="100000"/>
+              </a:lnSpc>
+              <a:spcBef>
+                <a:spcPts val="0"/>
+              </a:spcBef>
+              <a:spcAft>
+                <a:spcPts val="0"/>
+              </a:spcAft>
+              <a:buClrTx/>
+              <a:buSzTx/>
+              <a:buFontTx/>
+              <a:buNone/>
+              <a:tabLst/>
+              <a:defRPr/>
+            </a:pPr>
+            <a:r>
+              <a:rPr lang="en-US" dirty="0"/>
+              <a:t>1. US Immigrants from Mexico compared to those from the Hispanic Caribbean (60+)</a:t>
+            </a:r>
+          </a:p>
+          <a:p>
+            <a:r>
+              <a:rPr lang="en-US" dirty="0"/>
+              <a:t>2. We wanted to compare these movers to their home country stayers to get a better sense of the selection mechanisms at play</a:t>
+            </a:r>
+          </a:p>
+          <a:p>
+            <a:r>
+              <a:rPr lang="en-US" dirty="0"/>
+              <a:t>3. Lastly, we wanted to see how these selection patterns are changing over time</a:t>
             </a:r>
           </a:p>
           <a:p>
             <a:endParaRPr lang="en-US" dirty="0"/>
+          </a:p>
+          <a:p>
+            <a:r>
+              <a:rPr lang="en-US" dirty="0"/>
+              <a:t>We’re going to compare these migrants from Mexico those those from Puerto Rico, the Dominican Republic, and Cuba.</a:t>
+            </a:r>
           </a:p>
         </p:txBody>
       </p:sp>
@@ -1779,7 +1833,7 @@
           <a:p>
             <a:fld id="{6ADC826D-AAF9-3849-8641-F0AC1F9103F6}" type="slidenum">
               <a:rPr lang="en-US" smtClean="0"/>
-              <a:t>22</a:t>
+              <a:t>21</a:t>
             </a:fld>
             <a:endParaRPr lang="en-US"/>
           </a:p>
@@ -1788,7 +1842,7 @@
     </p:spTree>
     <p:extLst>
       <p:ext uri="{BB962C8B-B14F-4D97-AF65-F5344CB8AC3E}">
-        <p14:creationId xmlns:p14="http://schemas.microsoft.com/office/powerpoint/2010/main" val="3640223293"/>
+        <p14:creationId xmlns:p14="http://schemas.microsoft.com/office/powerpoint/2010/main" val="3372543243"/>
       </p:ext>
     </p:extLst>
   </p:cSld>
@@ -1843,18 +1897,42 @@
           <a:lstStyle/>
           <a:p>
             <a:r>
-              <a:rPr lang="en-US" dirty="0"/>
-              <a:t>It’s also important to note that the conditions in these countries have been rapidly changing, mostly for the better.  </a:t>
-            </a:r>
-          </a:p>
-          <a:p>
+              <a:rPr lang="en-US" b="0" i="0" dirty="0">
+                <a:effectLst/>
+                <a:latin typeface="fkGroteskNeue"/>
+              </a:rPr>
+              <a:t>While research on Hispanic migrant health has primarily focused on Mexican immigrants, who represent 44 percent of older US Hispanic immigrants, much less attention has been given to Hispanic Caribbean migrants. Migrants from Puerto Rico, Dominican Republic, and Cuba collectively make up about 30 percent of all older US Hispanic immigrants.</a:t>
+            </a:r>
+          </a:p>
+          <a:p>
+            <a:endParaRPr lang="en-US" b="0" i="0" dirty="0">
+              <a:effectLst/>
+              <a:latin typeface="fkGroteskNeue"/>
+            </a:endParaRPr>
+          </a:p>
+          <a:p>
+            <a:r>
+              <a:rPr lang="en-US" b="0" i="0" dirty="0">
+                <a:effectLst/>
+                <a:latin typeface="fkGroteskNeue"/>
+              </a:rPr>
+              <a:t>However, it’s not just important to highlight these groups because of their size, but also because they’re so different from each other other along the </a:t>
+            </a:r>
+            <a:r>
+              <a:rPr lang="en-US" b="0" i="0" dirty="0" err="1">
+                <a:effectLst/>
+                <a:latin typeface="fkGroteskNeue"/>
+              </a:rPr>
+              <a:t>sociodemographics</a:t>
+            </a:r>
+            <a:r>
+              <a:rPr lang="en-US" b="0" i="0" dirty="0">
+                <a:effectLst/>
+                <a:latin typeface="fkGroteskNeue"/>
+              </a:rPr>
+              <a:t> that are so important for healthy aging. </a:t>
+            </a:r>
             <a:endParaRPr lang="en-US" dirty="0"/>
-          </a:p>
-          <a:p>
-            <a:r>
-              <a:rPr lang="en-US" dirty="0"/>
-              <a:t>Here we plot the country’s infant mortality rate on the y axis and the year on the x axis just to show how these country conditions have changed over time. </a:t>
-            </a:r>
           </a:p>
         </p:txBody>
       </p:sp>
@@ -1875,7 +1953,7 @@
           <a:p>
             <a:fld id="{6ADC826D-AAF9-3849-8641-F0AC1F9103F6}" type="slidenum">
               <a:rPr lang="en-US" smtClean="0"/>
-              <a:t>3</a:t>
+              <a:t>2</a:t>
             </a:fld>
             <a:endParaRPr lang="en-US"/>
           </a:p>
@@ -1884,7 +1962,106 @@
     </p:spTree>
     <p:extLst>
       <p:ext uri="{BB962C8B-B14F-4D97-AF65-F5344CB8AC3E}">
-        <p14:creationId xmlns:p14="http://schemas.microsoft.com/office/powerpoint/2010/main" val="2753298777"/>
+        <p14:creationId xmlns:p14="http://schemas.microsoft.com/office/powerpoint/2010/main" val="217471622"/>
+      </p:ext>
+    </p:extLst>
+  </p:cSld>
+  <p:clrMapOvr>
+    <a:masterClrMapping/>
+  </p:clrMapOvr>
+</p:notes>
+</file>
+
+<file path=ppt/notesSlides/notesSlide20.xml><?xml version="1.0" encoding="utf-8"?>
+<p:notes xmlns:a="http://schemas.openxmlformats.org/drawingml/2006/main" xmlns:r="http://schemas.openxmlformats.org/officeDocument/2006/relationships" xmlns:p="http://schemas.openxmlformats.org/presentationml/2006/main">
+  <p:cSld>
+    <p:spTree>
+      <p:nvGrpSpPr>
+        <p:cNvPr id="1" name=""/>
+        <p:cNvGrpSpPr/>
+        <p:nvPr/>
+      </p:nvGrpSpPr>
+      <p:grpSpPr>
+        <a:xfrm>
+          <a:off x="0" y="0"/>
+          <a:ext cx="0" cy="0"/>
+          <a:chOff x="0" y="0"/>
+          <a:chExt cx="0" cy="0"/>
+        </a:xfrm>
+      </p:grpSpPr>
+      <p:sp>
+        <p:nvSpPr>
+          <p:cNvPr id="2" name="Slide Image Placeholder 1"/>
+          <p:cNvSpPr>
+            <a:spLocks noGrp="1" noRot="1" noChangeAspect="1"/>
+          </p:cNvSpPr>
+          <p:nvPr>
+            <p:ph type="sldImg"/>
+          </p:nvPr>
+        </p:nvSpPr>
+        <p:spPr/>
+      </p:sp>
+      <p:sp>
+        <p:nvSpPr>
+          <p:cNvPr id="3" name="Notes Placeholder 2"/>
+          <p:cNvSpPr>
+            <a:spLocks noGrp="1"/>
+          </p:cNvSpPr>
+          <p:nvPr>
+            <p:ph type="body" idx="1"/>
+          </p:nvPr>
+        </p:nvSpPr>
+        <p:spPr/>
+        <p:txBody>
+          <a:bodyPr/>
+          <a:lstStyle/>
+          <a:p>
+            <a:r>
+              <a:rPr lang="en-US" dirty="0"/>
+              <a:t>Research that DOES focus on differences within Hispanic groups finds important differences. </a:t>
+            </a:r>
+          </a:p>
+          <a:p>
+            <a:endParaRPr lang="en-US" dirty="0"/>
+          </a:p>
+          <a:p>
+            <a:r>
+              <a:rPr lang="en-US" dirty="0"/>
+              <a:t>Here we I’m showing data from the 10/66 study (which is not nationally representative and tends to skew towards urban residents), which finds that Hispanics in the Caribbean have generally higher rates of dementia despite having relatively higher life expectancies</a:t>
+            </a:r>
+          </a:p>
+          <a:p>
+            <a:endParaRPr lang="en-US" dirty="0"/>
+          </a:p>
+        </p:txBody>
+      </p:sp>
+      <p:sp>
+        <p:nvSpPr>
+          <p:cNvPr id="4" name="Slide Number Placeholder 3"/>
+          <p:cNvSpPr>
+            <a:spLocks noGrp="1"/>
+          </p:cNvSpPr>
+          <p:nvPr>
+            <p:ph type="sldNum" sz="quarter" idx="5"/>
+          </p:nvPr>
+        </p:nvSpPr>
+        <p:spPr/>
+        <p:txBody>
+          <a:bodyPr/>
+          <a:lstStyle/>
+          <a:p>
+            <a:fld id="{6ADC826D-AAF9-3849-8641-F0AC1F9103F6}" type="slidenum">
+              <a:rPr lang="en-US" smtClean="0"/>
+              <a:t>22</a:t>
+            </a:fld>
+            <a:endParaRPr lang="en-US"/>
+          </a:p>
+        </p:txBody>
+      </p:sp>
+    </p:spTree>
+    <p:extLst>
+      <p:ext uri="{BB962C8B-B14F-4D97-AF65-F5344CB8AC3E}">
+        <p14:creationId xmlns:p14="http://schemas.microsoft.com/office/powerpoint/2010/main" val="3640223293"/>
       </p:ext>
     </p:extLst>
   </p:cSld>
@@ -1938,153 +2115,68 @@
           <a:bodyPr/>
           <a:lstStyle/>
           <a:p>
-            <a:pPr marL="0" indent="0">
+            <a:r>
+              <a:rPr lang="en-US" b="0" i="0" dirty="0">
+                <a:effectLst/>
+                <a:latin typeface="fkGroteskNeue"/>
+              </a:rPr>
+              <a:t>These sociodemographic differences stem largely from distinct home country conditions. </a:t>
+            </a:r>
+          </a:p>
+          <a:p>
+            <a:endParaRPr lang="en-US" b="0" i="0" dirty="0">
+              <a:effectLst/>
+              <a:latin typeface="fkGroteskNeue"/>
+            </a:endParaRPr>
+          </a:p>
+          <a:p>
+            <a:r>
+              <a:rPr lang="en-US" b="0" i="0" dirty="0">
+                <a:effectLst/>
+                <a:latin typeface="fkGroteskNeue"/>
+              </a:rPr>
+              <a:t>Historical infant mortality rates clearly illustrate these disparities.</a:t>
+            </a:r>
+          </a:p>
+          <a:p>
+            <a:endParaRPr lang="en-US" b="0" i="0" dirty="0">
+              <a:effectLst/>
+              <a:latin typeface="fkGroteskNeue"/>
+            </a:endParaRPr>
+          </a:p>
+          <a:p>
+            <a:pPr algn="l">
               <a:buNone/>
             </a:pPr>
             <a:r>
-              <a:rPr lang="en-US" dirty="0"/>
-              <a:t>In this paper, we chose to focus on sociodemographic differences between migrants populations, specifically we were interested in comparing age 60 plus Mexican migrant populations to those from the Caribbean. </a:t>
-            </a:r>
-          </a:p>
-          <a:p>
-            <a:pPr marL="0" indent="0">
+              <a:rPr lang="en-US" b="0" i="0" dirty="0">
+                <a:effectLst/>
+                <a:latin typeface="fkGroteskNeue"/>
+              </a:rPr>
+              <a:t>Looking at this graph, where the x-axis shows time and the y-axis shows infant mortality rates, we see that in 1950, when many people in our study were born, we see dramatically different early childhood environments across these countries.</a:t>
+            </a:r>
+          </a:p>
+          <a:p>
+            <a:pPr algn="l">
               <a:buNone/>
             </a:pPr>
+            <a:endParaRPr lang="en-US" b="0" i="0" dirty="0">
+              <a:effectLst/>
+              <a:latin typeface="fkGroteskNeue"/>
+            </a:endParaRPr>
+          </a:p>
+          <a:p>
+            <a:pPr algn="l"/>
+            <a:r>
+              <a:rPr lang="en-US" b="0" i="0" dirty="0">
+                <a:effectLst/>
+                <a:latin typeface="fkGroteskNeue"/>
+              </a:rPr>
+              <a:t>These early life conditions are important because they will have significant implications for health in later life.</a:t>
+            </a:r>
+          </a:p>
+          <a:p>
             <a:endParaRPr lang="en-US" dirty="0"/>
-          </a:p>
-          <a:p>
-            <a:pPr marL="0" indent="0">
-              <a:buNone/>
-            </a:pPr>
-            <a:r>
-              <a:rPr lang="en-US" dirty="0"/>
-              <a:t>We chose sociodemographic differences because they’re important for understanding aging disparities between Hispanic migrant populations. </a:t>
-            </a:r>
-          </a:p>
-          <a:p>
-            <a:pPr marL="0" indent="0">
-              <a:buNone/>
-            </a:pPr>
-            <a:endParaRPr lang="en-US" dirty="0"/>
-          </a:p>
-          <a:p>
-            <a:pPr marL="0" indent="0">
-              <a:buNone/>
-            </a:pPr>
-            <a:r>
-              <a:rPr lang="en-US" dirty="0"/>
-              <a:t>And so, this is why if your goal is to understand aging health it’s so important to understand how migrants differ in things like education and social support</a:t>
-            </a:r>
-          </a:p>
-          <a:p>
-            <a:pPr marL="0" indent="0">
-              <a:buNone/>
-            </a:pPr>
-            <a:endParaRPr lang="en-US" dirty="0"/>
-          </a:p>
-          <a:p>
-            <a:pPr marL="0" indent="0">
-              <a:buNone/>
-            </a:pPr>
-            <a:r>
-              <a:rPr lang="en-US" dirty="0"/>
-              <a:t>Crimmins: https://</a:t>
-            </a:r>
-            <a:r>
-              <a:rPr lang="en-US" dirty="0" err="1"/>
-              <a:t>pubmed.ncbi.nlm.nih.gov</a:t>
-            </a:r>
-            <a:r>
-              <a:rPr lang="en-US" dirty="0"/>
-              <a:t>/32798771/</a:t>
-            </a:r>
-          </a:p>
-          <a:p>
-            <a:pPr marL="0" indent="0">
-              <a:buNone/>
-            </a:pPr>
-            <a:r>
-              <a:rPr lang="en-US" dirty="0" err="1"/>
-              <a:t>Rentsher</a:t>
-            </a:r>
-            <a:r>
-              <a:rPr lang="en-US" dirty="0"/>
-              <a:t>: https://www-</a:t>
-            </a:r>
-            <a:r>
-              <a:rPr lang="en-US" dirty="0" err="1"/>
-              <a:t>sciencedirect</a:t>
-            </a:r>
-            <a:r>
-              <a:rPr lang="en-US" dirty="0"/>
-              <a:t>-</a:t>
-            </a:r>
-            <a:r>
-              <a:rPr lang="en-US" dirty="0" err="1"/>
-              <a:t>com.libproxy.berkeley.edu</a:t>
-            </a:r>
-            <a:r>
-              <a:rPr lang="en-US" dirty="0"/>
-              <a:t>/science/article/</a:t>
-            </a:r>
-            <a:r>
-              <a:rPr lang="en-US" dirty="0" err="1"/>
-              <a:t>pii</a:t>
-            </a:r>
-            <a:r>
-              <a:rPr lang="en-US" dirty="0"/>
-              <a:t>/S0889159123002660?via%3Dihub</a:t>
-            </a:r>
-          </a:p>
-          <a:p>
-            <a:pPr marL="0" indent="0">
-              <a:buNone/>
-            </a:pPr>
-            <a:r>
-              <a:rPr lang="en-US" dirty="0"/>
-              <a:t>Barger (social support and telomere length): https://www-</a:t>
-            </a:r>
-            <a:r>
-              <a:rPr lang="en-US" dirty="0" err="1"/>
-              <a:t>sciencedirect</a:t>
-            </a:r>
-            <a:r>
-              <a:rPr lang="en-US" dirty="0"/>
-              <a:t>-</a:t>
-            </a:r>
-            <a:r>
-              <a:rPr lang="en-US" dirty="0" err="1"/>
-              <a:t>com.libproxy.berkeley.edu</a:t>
-            </a:r>
-            <a:r>
-              <a:rPr lang="en-US" dirty="0"/>
-              <a:t>/science/article/</a:t>
-            </a:r>
-            <a:r>
-              <a:rPr lang="en-US" dirty="0" err="1"/>
-              <a:t>pii</a:t>
-            </a:r>
-            <a:r>
-              <a:rPr lang="en-US" dirty="0"/>
-              <a:t>/S0301051116300035</a:t>
-            </a:r>
-          </a:p>
-          <a:p>
-            <a:pPr marL="0" indent="0">
-              <a:buNone/>
-            </a:pPr>
-            <a:r>
-              <a:rPr lang="en-US" dirty="0"/>
-              <a:t>Li: https://</a:t>
-            </a:r>
-            <a:r>
-              <a:rPr lang="en-US" dirty="0" err="1"/>
-              <a:t>pmc.ncbi.nlm.nih.gov</a:t>
-            </a:r>
-            <a:r>
-              <a:rPr lang="en-US" dirty="0"/>
-              <a:t>/articles/PMC8418669/pdf/TRC2-7-e12204.pdf</a:t>
-            </a:r>
           </a:p>
         </p:txBody>
       </p:sp>
@@ -2105,7 +2197,7 @@
           <a:p>
             <a:fld id="{6ADC826D-AAF9-3849-8641-F0AC1F9103F6}" type="slidenum">
               <a:rPr lang="en-US" smtClean="0"/>
-              <a:t>4</a:t>
+              <a:t>3</a:t>
             </a:fld>
             <a:endParaRPr lang="en-US"/>
           </a:p>
@@ -2114,7 +2206,7 @@
     </p:spTree>
     <p:extLst>
       <p:ext uri="{BB962C8B-B14F-4D97-AF65-F5344CB8AC3E}">
-        <p14:creationId xmlns:p14="http://schemas.microsoft.com/office/powerpoint/2010/main" val="957753569"/>
+        <p14:creationId xmlns:p14="http://schemas.microsoft.com/office/powerpoint/2010/main" val="2753298777"/>
       </p:ext>
     </p:extLst>
   </p:cSld>
@@ -2168,9 +2260,237 @@
           <a:bodyPr/>
           <a:lstStyle/>
           <a:p>
-            <a:r>
-              <a:rPr lang="en-US" dirty="0"/>
-              <a:t>- International </a:t>
+            <a:pPr algn="l">
+              <a:buNone/>
+            </a:pPr>
+            <a:r>
+              <a:rPr lang="en-US" b="0" i="0" dirty="0">
+                <a:effectLst/>
+                <a:latin typeface="fkGroteskNeue"/>
+              </a:rPr>
+              <a:t>While I mentioned these groups are understudied, there is a growing literature showing these Hispanic populations do differ significantly in health outcomes. </a:t>
+            </a:r>
+          </a:p>
+          <a:p>
+            <a:pPr algn="l">
+              <a:buNone/>
+            </a:pPr>
+            <a:endParaRPr lang="en-US" b="0" i="0" dirty="0">
+              <a:effectLst/>
+              <a:latin typeface="fkGroteskNeue"/>
+            </a:endParaRPr>
+          </a:p>
+          <a:p>
+            <a:pPr algn="l">
+              <a:buNone/>
+            </a:pPr>
+            <a:r>
+              <a:rPr lang="en-US" b="0" i="0" dirty="0">
+                <a:effectLst/>
+                <a:latin typeface="fkGroteskNeue"/>
+              </a:rPr>
+              <a:t>Researchers like our chair Marc Garcia (who ended up being quite influential to our research) have used the National Health Interview Survey to document important morbidity differences between these groups.</a:t>
+            </a:r>
+          </a:p>
+          <a:p>
+            <a:pPr algn="l">
+              <a:buNone/>
+            </a:pPr>
+            <a:endParaRPr lang="en-US" b="0" i="0" dirty="0">
+              <a:effectLst/>
+              <a:latin typeface="fkGroteskNeue"/>
+            </a:endParaRPr>
+          </a:p>
+          <a:p>
+            <a:pPr marL="0" marR="0" lvl="0" indent="0" algn="l" defTabSz="914400" rtl="0" eaLnBrk="1" fontAlgn="auto" latinLnBrk="0" hangingPunct="1">
+              <a:lnSpc>
+                <a:spcPct val="100000"/>
+              </a:lnSpc>
+              <a:spcBef>
+                <a:spcPts val="0"/>
+              </a:spcBef>
+              <a:spcAft>
+                <a:spcPts val="0"/>
+              </a:spcAft>
+              <a:buClrTx/>
+              <a:buSzTx/>
+              <a:buFontTx/>
+              <a:buNone/>
+              <a:tabLst/>
+              <a:defRPr/>
+            </a:pPr>
+            <a:r>
+              <a:rPr lang="en-US" b="0" i="0" dirty="0">
+                <a:effectLst/>
+                <a:latin typeface="fkGroteskNeue"/>
+              </a:rPr>
+              <a:t>However, the NHIS offers a relatively small sample size for these populations, requiring researchers to pool data across many years to obtain sufficient numbers - for example, just over 100 Dominican migrants even after pooling.</a:t>
+            </a:r>
+          </a:p>
+          <a:p>
+            <a:pPr marL="0" marR="0" lvl="0" indent="0" algn="l" defTabSz="914400" rtl="0" eaLnBrk="1" fontAlgn="auto" latinLnBrk="0" hangingPunct="1">
+              <a:lnSpc>
+                <a:spcPct val="100000"/>
+              </a:lnSpc>
+              <a:spcBef>
+                <a:spcPts val="0"/>
+              </a:spcBef>
+              <a:spcAft>
+                <a:spcPts val="0"/>
+              </a:spcAft>
+              <a:buClrTx/>
+              <a:buSzTx/>
+              <a:buFontTx/>
+              <a:buNone/>
+              <a:tabLst/>
+              <a:defRPr/>
+            </a:pPr>
+            <a:endParaRPr lang="en-US" b="0" i="0" dirty="0">
+              <a:effectLst/>
+              <a:latin typeface="fkGroteskNeue"/>
+            </a:endParaRPr>
+          </a:p>
+          <a:p>
+            <a:pPr marL="0" marR="0" lvl="0" indent="0" algn="l" defTabSz="914400" rtl="0" eaLnBrk="1" fontAlgn="auto" latinLnBrk="0" hangingPunct="1">
+              <a:lnSpc>
+                <a:spcPct val="100000"/>
+              </a:lnSpc>
+              <a:spcBef>
+                <a:spcPts val="0"/>
+              </a:spcBef>
+              <a:spcAft>
+                <a:spcPts val="0"/>
+              </a:spcAft>
+              <a:buClrTx/>
+              <a:buSzTx/>
+              <a:buFontTx/>
+              <a:buNone/>
+              <a:tabLst/>
+              <a:defRPr/>
+            </a:pPr>
+            <a:r>
+              <a:rPr lang="en-US" b="0" i="0" dirty="0">
+                <a:effectLst/>
+                <a:latin typeface="fkGroteskNeue"/>
+              </a:rPr>
+              <a:t>That's why we chose to analyze data from the 2016-20 American Community Survey, which gives us a much larger sample size and helps us support the health documented in previous research.</a:t>
+            </a:r>
+          </a:p>
+          <a:p>
+            <a:pPr marL="0" marR="0" lvl="0" indent="0" algn="l" defTabSz="914400" rtl="0" eaLnBrk="1" fontAlgn="auto" latinLnBrk="0" hangingPunct="1">
+              <a:lnSpc>
+                <a:spcPct val="100000"/>
+              </a:lnSpc>
+              <a:spcBef>
+                <a:spcPts val="0"/>
+              </a:spcBef>
+              <a:spcAft>
+                <a:spcPts val="0"/>
+              </a:spcAft>
+              <a:buClrTx/>
+              <a:buSzTx/>
+              <a:buFontTx/>
+              <a:buNone/>
+              <a:tabLst/>
+              <a:defRPr/>
+            </a:pPr>
+            <a:endParaRPr lang="en-US" b="0" i="0" dirty="0">
+              <a:effectLst/>
+              <a:latin typeface="fkGroteskNeue"/>
+            </a:endParaRPr>
+          </a:p>
+          <a:p>
+            <a:pPr algn="l">
+              <a:buNone/>
+            </a:pPr>
+            <a:r>
+              <a:rPr lang="en-US" b="0" i="0" dirty="0">
+                <a:effectLst/>
+                <a:latin typeface="fkGroteskNeue"/>
+              </a:rPr>
+              <a:t>More specifically</a:t>
+            </a:r>
+            <a:r>
+              <a:rPr lang="en-US" b="0" i="0">
+                <a:effectLst/>
+                <a:latin typeface="fkGroteskNeue"/>
+              </a:rPr>
+              <a:t>, in </a:t>
+            </a:r>
+            <a:r>
+              <a:rPr lang="en-US" b="0" i="0" dirty="0">
+                <a:effectLst/>
+                <a:latin typeface="fkGroteskNeue"/>
+              </a:rPr>
+              <a:t>our analysis, we focus on key sociodemographic factors in the ACS that influence healthy </a:t>
+            </a:r>
+            <a:r>
+              <a:rPr lang="en-US" b="0" i="0">
+                <a:effectLst/>
+                <a:latin typeface="fkGroteskNeue"/>
+              </a:rPr>
+              <a:t>aging:</a:t>
+            </a:r>
+          </a:p>
+          <a:p>
+            <a:pPr algn="l">
+              <a:buNone/>
+            </a:pPr>
+            <a:endParaRPr lang="en-US" b="0" i="0" dirty="0">
+              <a:effectLst/>
+              <a:latin typeface="fkGroteskNeue"/>
+            </a:endParaRPr>
+          </a:p>
+          <a:p>
+            <a:pPr algn="l">
+              <a:buFont typeface="Arial" panose="020B0604020202020204" pitchFamily="34" charset="0"/>
+              <a:buChar char="•"/>
+            </a:pPr>
+            <a:r>
+              <a:rPr lang="en-US" b="0" i="0" dirty="0">
+                <a:effectLst/>
+                <a:latin typeface="fkGroteskNeue"/>
+              </a:rPr>
+              <a:t>Migration timing (year and age of migration)</a:t>
+            </a:r>
+          </a:p>
+          <a:p>
+            <a:pPr algn="l">
+              <a:buFont typeface="Arial" panose="020B0604020202020204" pitchFamily="34" charset="0"/>
+              <a:buChar char="•"/>
+            </a:pPr>
+            <a:r>
+              <a:rPr lang="en-US" b="0" i="0" dirty="0">
+                <a:effectLst/>
+                <a:latin typeface="fkGroteskNeue"/>
+              </a:rPr>
+              <a:t>Educational attainment</a:t>
+            </a:r>
+          </a:p>
+          <a:p>
+            <a:pPr algn="l">
+              <a:buFont typeface="Arial" panose="020B0604020202020204" pitchFamily="34" charset="0"/>
+              <a:buChar char="•"/>
+            </a:pPr>
+            <a:r>
+              <a:rPr lang="en-US" b="0" i="0" dirty="0">
+                <a:effectLst/>
+                <a:latin typeface="fkGroteskNeue"/>
+              </a:rPr>
+              <a:t>Social isolation (marital status and living arrangements)</a:t>
+            </a:r>
+          </a:p>
+          <a:p>
+            <a:pPr algn="l">
+              <a:buFont typeface="Arial" panose="020B0604020202020204" pitchFamily="34" charset="0"/>
+              <a:buChar char="•"/>
+            </a:pPr>
+            <a:r>
+              <a:rPr lang="en-US" b="0" i="0" dirty="0">
+                <a:effectLst/>
+                <a:latin typeface="fkGroteskNeue"/>
+              </a:rPr>
+              <a:t>Acculturation (English speaking ability and citizenship status)</a:t>
             </a:r>
           </a:p>
         </p:txBody>
@@ -2192,7 +2512,7 @@
           <a:p>
             <a:fld id="{6ADC826D-AAF9-3849-8641-F0AC1F9103F6}" type="slidenum">
               <a:rPr lang="en-US" smtClean="0"/>
-              <a:t>5</a:t>
+              <a:t>4</a:t>
             </a:fld>
             <a:endParaRPr lang="en-US"/>
           </a:p>
@@ -2201,7 +2521,7 @@
     </p:spTree>
     <p:extLst>
       <p:ext uri="{BB962C8B-B14F-4D97-AF65-F5344CB8AC3E}">
-        <p14:creationId xmlns:p14="http://schemas.microsoft.com/office/powerpoint/2010/main" val="1953118807"/>
+        <p14:creationId xmlns:p14="http://schemas.microsoft.com/office/powerpoint/2010/main" val="957753569"/>
       </p:ext>
     </p:extLst>
   </p:cSld>
@@ -2255,34 +2575,9 @@
           <a:bodyPr/>
           <a:lstStyle/>
           <a:p>
-            <a:pPr marL="0" indent="0">
-              <a:buNone/>
-            </a:pPr>
-            <a:r>
-              <a:rPr lang="en-US" dirty="0"/>
-              <a:t>Say these verbally</a:t>
-            </a:r>
-          </a:p>
-          <a:p>
-            <a:pPr marL="0" indent="0">
-              <a:buNone/>
-            </a:pPr>
-            <a:endParaRPr lang="en-US" dirty="0"/>
-          </a:p>
-          <a:p>
-            <a:r>
-              <a:rPr lang="en-US" dirty="0"/>
-              <a:t>Puerto Rico became a US territory in 1898. In 1917 they were granted US citizenship.</a:t>
-            </a:r>
-            <a:br>
-              <a:rPr lang="en-US" dirty="0"/>
-            </a:br>
-            <a:endParaRPr lang="en-US" dirty="0"/>
-          </a:p>
-          <a:p>
-            <a:r>
-              <a:rPr lang="en-US" dirty="0"/>
-              <a:t>Cuban Revolution in 1959 sparked one of the largest refugee movement in US history (Duany 2017). In 1966, given path to US residency. </a:t>
+            <a:r>
+              <a:rPr lang="en-US" dirty="0"/>
+              <a:t>- International </a:t>
             </a:r>
           </a:p>
         </p:txBody>
@@ -2304,7 +2599,7 @@
           <a:p>
             <a:fld id="{6ADC826D-AAF9-3849-8641-F0AC1F9103F6}" type="slidenum">
               <a:rPr lang="en-US" smtClean="0"/>
-              <a:t>6</a:t>
+              <a:t>5</a:t>
             </a:fld>
             <a:endParaRPr lang="en-US"/>
           </a:p>
@@ -2313,7 +2608,7 @@
     </p:spTree>
     <p:extLst>
       <p:ext uri="{BB962C8B-B14F-4D97-AF65-F5344CB8AC3E}">
-        <p14:creationId xmlns:p14="http://schemas.microsoft.com/office/powerpoint/2010/main" val="1660434206"/>
+        <p14:creationId xmlns:p14="http://schemas.microsoft.com/office/powerpoint/2010/main" val="1953118807"/>
       </p:ext>
     </p:extLst>
   </p:cSld>
@@ -2367,6 +2662,118 @@
           <a:bodyPr/>
           <a:lstStyle/>
           <a:p>
+            <a:pPr marL="0" indent="0">
+              <a:buNone/>
+            </a:pPr>
+            <a:r>
+              <a:rPr lang="en-US" dirty="0"/>
+              <a:t>Say these verbally</a:t>
+            </a:r>
+          </a:p>
+          <a:p>
+            <a:pPr marL="0" indent="0">
+              <a:buNone/>
+            </a:pPr>
+            <a:endParaRPr lang="en-US" dirty="0"/>
+          </a:p>
+          <a:p>
+            <a:r>
+              <a:rPr lang="en-US" dirty="0"/>
+              <a:t>Puerto Rico became a US territory in 1898. In 1917 they were granted US citizenship.</a:t>
+            </a:r>
+            <a:br>
+              <a:rPr lang="en-US" dirty="0"/>
+            </a:br>
+            <a:endParaRPr lang="en-US" dirty="0"/>
+          </a:p>
+          <a:p>
+            <a:r>
+              <a:rPr lang="en-US" dirty="0"/>
+              <a:t>Cuban Revolution in 1959 sparked one of the largest refugee movement in US history (Duany 2017). In 1966, given path to US residency. </a:t>
+            </a:r>
+          </a:p>
+        </p:txBody>
+      </p:sp>
+      <p:sp>
+        <p:nvSpPr>
+          <p:cNvPr id="4" name="Slide Number Placeholder 3"/>
+          <p:cNvSpPr>
+            <a:spLocks noGrp="1"/>
+          </p:cNvSpPr>
+          <p:nvPr>
+            <p:ph type="sldNum" sz="quarter" idx="5"/>
+          </p:nvPr>
+        </p:nvSpPr>
+        <p:spPr/>
+        <p:txBody>
+          <a:bodyPr/>
+          <a:lstStyle/>
+          <a:p>
+            <a:fld id="{6ADC826D-AAF9-3849-8641-F0AC1F9103F6}" type="slidenum">
+              <a:rPr lang="en-US" smtClean="0"/>
+              <a:t>6</a:t>
+            </a:fld>
+            <a:endParaRPr lang="en-US"/>
+          </a:p>
+        </p:txBody>
+      </p:sp>
+    </p:spTree>
+    <p:extLst>
+      <p:ext uri="{BB962C8B-B14F-4D97-AF65-F5344CB8AC3E}">
+        <p14:creationId xmlns:p14="http://schemas.microsoft.com/office/powerpoint/2010/main" val="1660434206"/>
+      </p:ext>
+    </p:extLst>
+  </p:cSld>
+  <p:clrMapOvr>
+    <a:masterClrMapping/>
+  </p:clrMapOvr>
+</p:notes>
+</file>
+
+<file path=ppt/notesSlides/notesSlide7.xml><?xml version="1.0" encoding="utf-8"?>
+<p:notes xmlns:a="http://schemas.openxmlformats.org/drawingml/2006/main" xmlns:r="http://schemas.openxmlformats.org/officeDocument/2006/relationships" xmlns:p="http://schemas.openxmlformats.org/presentationml/2006/main">
+  <p:cSld>
+    <p:spTree>
+      <p:nvGrpSpPr>
+        <p:cNvPr id="1" name=""/>
+        <p:cNvGrpSpPr/>
+        <p:nvPr/>
+      </p:nvGrpSpPr>
+      <p:grpSpPr>
+        <a:xfrm>
+          <a:off x="0" y="0"/>
+          <a:ext cx="0" cy="0"/>
+          <a:chOff x="0" y="0"/>
+          <a:chExt cx="0" cy="0"/>
+        </a:xfrm>
+      </p:grpSpPr>
+      <p:sp>
+        <p:nvSpPr>
+          <p:cNvPr id="2" name="Slide Image Placeholder 1"/>
+          <p:cNvSpPr>
+            <a:spLocks noGrp="1" noRot="1" noChangeAspect="1"/>
+          </p:cNvSpPr>
+          <p:nvPr>
+            <p:ph type="sldImg"/>
+          </p:nvPr>
+        </p:nvSpPr>
+        <p:spPr/>
+      </p:sp>
+      <p:sp>
+        <p:nvSpPr>
+          <p:cNvPr id="3" name="Notes Placeholder 2"/>
+          <p:cNvSpPr>
+            <a:spLocks noGrp="1"/>
+          </p:cNvSpPr>
+          <p:nvPr>
+            <p:ph type="body" idx="1"/>
+          </p:nvPr>
+        </p:nvSpPr>
+        <p:spPr/>
+        <p:txBody>
+          <a:bodyPr/>
+          <a:lstStyle/>
+          <a:p>
             <a:r>
               <a:rPr lang="en-US" dirty="0"/>
               <a:t>Key points:</a:t>
@@ -2446,7 +2853,7 @@
 </p:notes>
 </file>
 
-<file path=ppt/notesSlides/notesSlide7.xml><?xml version="1.0" encoding="utf-8"?>
+<file path=ppt/notesSlides/notesSlide8.xml><?xml version="1.0" encoding="utf-8"?>
 <p:notes xmlns:a="http://schemas.openxmlformats.org/drawingml/2006/main" xmlns:r="http://schemas.openxmlformats.org/officeDocument/2006/relationships" xmlns:p="http://schemas.openxmlformats.org/presentationml/2006/main">
   <p:cSld>
     <p:spTree>
@@ -2565,115 +2972,6 @@
     <p:extLst>
       <p:ext uri="{BB962C8B-B14F-4D97-AF65-F5344CB8AC3E}">
         <p14:creationId xmlns:p14="http://schemas.microsoft.com/office/powerpoint/2010/main" val="2364996275"/>
-      </p:ext>
-    </p:extLst>
-  </p:cSld>
-  <p:clrMapOvr>
-    <a:masterClrMapping/>
-  </p:clrMapOvr>
-</p:notes>
-</file>
-
-<file path=ppt/notesSlides/notesSlide8.xml><?xml version="1.0" encoding="utf-8"?>
-<p:notes xmlns:a="http://schemas.openxmlformats.org/drawingml/2006/main" xmlns:r="http://schemas.openxmlformats.org/officeDocument/2006/relationships" xmlns:p="http://schemas.openxmlformats.org/presentationml/2006/main">
-  <p:cSld>
-    <p:spTree>
-      <p:nvGrpSpPr>
-        <p:cNvPr id="1" name=""/>
-        <p:cNvGrpSpPr/>
-        <p:nvPr/>
-      </p:nvGrpSpPr>
-      <p:grpSpPr>
-        <a:xfrm>
-          <a:off x="0" y="0"/>
-          <a:ext cx="0" cy="0"/>
-          <a:chOff x="0" y="0"/>
-          <a:chExt cx="0" cy="0"/>
-        </a:xfrm>
-      </p:grpSpPr>
-      <p:sp>
-        <p:nvSpPr>
-          <p:cNvPr id="2" name="Slide Image Placeholder 1"/>
-          <p:cNvSpPr>
-            <a:spLocks noGrp="1" noRot="1" noChangeAspect="1"/>
-          </p:cNvSpPr>
-          <p:nvPr>
-            <p:ph type="sldImg"/>
-          </p:nvPr>
-        </p:nvSpPr>
-        <p:spPr/>
-      </p:sp>
-      <p:sp>
-        <p:nvSpPr>
-          <p:cNvPr id="3" name="Notes Placeholder 2"/>
-          <p:cNvSpPr>
-            <a:spLocks noGrp="1"/>
-          </p:cNvSpPr>
-          <p:nvPr>
-            <p:ph type="body" idx="1"/>
-          </p:nvPr>
-        </p:nvSpPr>
-        <p:spPr/>
-        <p:txBody>
-          <a:bodyPr/>
-          <a:lstStyle/>
-          <a:p>
-            <a:r>
-              <a:rPr lang="en-US" dirty="0"/>
-              <a:t>These are really different groups, then how much of that is related to what’s going in their home countries </a:t>
-            </a:r>
-          </a:p>
-          <a:p>
-            <a:endParaRPr lang="en-US" dirty="0"/>
-          </a:p>
-          <a:p>
-            <a:r>
-              <a:rPr lang="en-US" dirty="0"/>
-              <a:t>What stands out</a:t>
-            </a:r>
-            <a:br>
-              <a:rPr lang="en-US" dirty="0"/>
-            </a:br>
-            <a:r>
-              <a:rPr lang="en-US" dirty="0"/>
-              <a:t>- Mexican migrants are the least likely to get at least a secondary degree, which is lower than the average for migrant from the Caribbean</a:t>
-            </a:r>
-          </a:p>
-          <a:p>
-            <a:r>
-              <a:rPr lang="en-US" dirty="0"/>
-              <a:t>- Specifically, Cuban migrants are the most likely to have at least a high school degree followed by Puerto Ricans, and lastly Dominicans</a:t>
-            </a:r>
-          </a:p>
-        </p:txBody>
-      </p:sp>
-      <p:sp>
-        <p:nvSpPr>
-          <p:cNvPr id="4" name="Slide Number Placeholder 3"/>
-          <p:cNvSpPr>
-            <a:spLocks noGrp="1"/>
-          </p:cNvSpPr>
-          <p:nvPr>
-            <p:ph type="sldNum" sz="quarter" idx="5"/>
-          </p:nvPr>
-        </p:nvSpPr>
-        <p:spPr/>
-        <p:txBody>
-          <a:bodyPr/>
-          <a:lstStyle/>
-          <a:p>
-            <a:fld id="{6ADC826D-AAF9-3849-8641-F0AC1F9103F6}" type="slidenum">
-              <a:rPr lang="en-US" smtClean="0"/>
-              <a:t>9</a:t>
-            </a:fld>
-            <a:endParaRPr lang="en-US"/>
-          </a:p>
-        </p:txBody>
-      </p:sp>
-    </p:spTree>
-    <p:extLst>
-      <p:ext uri="{BB962C8B-B14F-4D97-AF65-F5344CB8AC3E}">
-        <p14:creationId xmlns:p14="http://schemas.microsoft.com/office/powerpoint/2010/main" val="884276519"/>
       </p:ext>
     </p:extLst>
   </p:cSld>
@@ -2729,7 +3027,29 @@
           <a:p>
             <a:r>
               <a:rPr lang="en-US" dirty="0"/>
-              <a:t>All of these are statistically significant </a:t>
+              <a:t>These are really different groups, then how much of that is related to what’s going in their home countries </a:t>
+            </a:r>
+          </a:p>
+          <a:p>
+            <a:endParaRPr lang="en-US" dirty="0"/>
+          </a:p>
+          <a:p>
+            <a:r>
+              <a:rPr lang="en-US" dirty="0"/>
+              <a:t>What stands out</a:t>
+            </a:r>
+            <a:br>
+              <a:rPr lang="en-US" dirty="0"/>
+            </a:br>
+            <a:r>
+              <a:rPr lang="en-US" dirty="0"/>
+              <a:t>- Mexican migrants are the least likely to get at least a secondary degree, which is lower than the average for migrant from the Caribbean</a:t>
+            </a:r>
+          </a:p>
+          <a:p>
+            <a:r>
+              <a:rPr lang="en-US" dirty="0"/>
+              <a:t>- Specifically, Cuban migrants are the most likely to have at least a high school degree followed by Puerto Ricans, and lastly Dominicans</a:t>
             </a:r>
           </a:p>
         </p:txBody>
@@ -2751,7 +3071,7 @@
           <a:p>
             <a:fld id="{6ADC826D-AAF9-3849-8641-F0AC1F9103F6}" type="slidenum">
               <a:rPr lang="en-US" smtClean="0"/>
-              <a:t>10</a:t>
+              <a:t>9</a:t>
             </a:fld>
             <a:endParaRPr lang="en-US"/>
           </a:p>
@@ -2760,7 +3080,7 @@
     </p:spTree>
     <p:extLst>
       <p:ext uri="{BB962C8B-B14F-4D97-AF65-F5344CB8AC3E}">
-        <p14:creationId xmlns:p14="http://schemas.microsoft.com/office/powerpoint/2010/main" val="3303427139"/>
+        <p14:creationId xmlns:p14="http://schemas.microsoft.com/office/powerpoint/2010/main" val="884276519"/>
       </p:ext>
     </p:extLst>
   </p:cSld>
@@ -6088,7 +6408,7 @@
           <p:nvPr/>
         </p:nvPicPr>
         <p:blipFill>
-          <a:blip r:embed="rId2">
+          <a:blip r:embed="rId3">
             <a:extLst>
               <a:ext uri="{28A0092B-C50C-407E-A947-70E740481C1C}">
                 <a14:useLocalDpi xmlns:a14="http://schemas.microsoft.com/office/drawing/2010/main" val="0"/>
@@ -6289,93 +6609,6 @@
       </p:sp>
       <p:pic>
         <p:nvPicPr>
-          <p:cNvPr id="6" name="Picture 2" descr="American Community Survey (ACS) – Roadmap to the 2030 Census">
-            <a:extLst>
-              <a:ext uri="{FF2B5EF4-FFF2-40B4-BE49-F238E27FC236}">
-                <a16:creationId xmlns:a16="http://schemas.microsoft.com/office/drawing/2014/main" id="{158C7D5C-2D11-2AF4-6497-7539D41DBAC3}"/>
-              </a:ext>
-            </a:extLst>
-          </p:cNvPr>
-          <p:cNvPicPr>
-            <a:picLocks noChangeAspect="1" noChangeArrowheads="1"/>
-          </p:cNvPicPr>
-          <p:nvPr/>
-        </p:nvPicPr>
-        <p:blipFill>
-          <a:blip r:embed="rId3">
-            <a:extLst>
-              <a:ext uri="{28A0092B-C50C-407E-A947-70E740481C1C}">
-                <a14:useLocalDpi xmlns:a14="http://schemas.microsoft.com/office/drawing/2010/main" val="0"/>
-              </a:ext>
-            </a:extLst>
-          </a:blip>
-          <a:srcRect/>
-          <a:stretch>
-            <a:fillRect/>
-          </a:stretch>
-        </p:blipFill>
-        <p:spPr bwMode="auto">
-          <a:xfrm>
-            <a:off x="11214652" y="132392"/>
-            <a:ext cx="750376" cy="750376"/>
-          </a:xfrm>
-          <a:prstGeom prst="rect">
-            <a:avLst/>
-          </a:prstGeom>
-          <a:noFill/>
-          <a:extLst>
-            <a:ext uri="{909E8E84-426E-40DD-AFC4-6F175D3DCCD1}">
-              <a14:hiddenFill xmlns:a14="http://schemas.microsoft.com/office/drawing/2010/main">
-                <a:solidFill>
-                  <a:srgbClr val="FFFFFF"/>
-                </a:solidFill>
-              </a14:hiddenFill>
-            </a:ext>
-          </a:extLst>
-        </p:spPr>
-      </p:pic>
-      <p:sp>
-        <p:nvSpPr>
-          <p:cNvPr id="7" name="TextBox 6">
-            <a:extLst>
-              <a:ext uri="{FF2B5EF4-FFF2-40B4-BE49-F238E27FC236}">
-                <a16:creationId xmlns:a16="http://schemas.microsoft.com/office/drawing/2014/main" id="{DB4AE0DD-146E-AD04-0576-1E6704BE55FC}"/>
-              </a:ext>
-            </a:extLst>
-          </p:cNvPr>
-          <p:cNvSpPr txBox="1"/>
-          <p:nvPr/>
-        </p:nvSpPr>
-        <p:spPr>
-          <a:xfrm>
-            <a:off x="11299066" y="894258"/>
-            <a:ext cx="704294" cy="338554"/>
-          </a:xfrm>
-          <a:prstGeom prst="rect">
-            <a:avLst/>
-          </a:prstGeom>
-          <a:noFill/>
-        </p:spPr>
-        <p:txBody>
-          <a:bodyPr wrap="square" rtlCol="0">
-            <a:spAutoFit/>
-          </a:bodyPr>
-          <a:lstStyle/>
-          <a:p>
-            <a:r>
-              <a:rPr lang="en-US" sz="1600" dirty="0">
-                <a:latin typeface="Abadi MT Condensed Light" panose="020B0306030101010103" pitchFamily="34" charset="77"/>
-              </a:rPr>
-              <a:t>2020</a:t>
-            </a:r>
-            <a:endParaRPr lang="en-US" dirty="0">
-              <a:latin typeface="Abadi MT Condensed Light" panose="020B0306030101010103" pitchFamily="34" charset="77"/>
-            </a:endParaRPr>
-          </a:p>
-        </p:txBody>
-      </p:sp>
-      <p:pic>
-        <p:nvPicPr>
           <p:cNvPr id="8" name="Picture 7">
             <a:extLst>
               <a:ext uri="{FF2B5EF4-FFF2-40B4-BE49-F238E27FC236}">
@@ -6389,7 +6622,7 @@
           <p:nvPr/>
         </p:nvPicPr>
         <p:blipFill>
-          <a:blip r:embed="rId4"/>
+          <a:blip r:embed="rId3"/>
           <a:srcRect/>
           <a:stretch/>
         </p:blipFill>
@@ -6403,6 +6636,114 @@
           </a:prstGeom>
         </p:spPr>
       </p:pic>
+      <p:grpSp>
+        <p:nvGrpSpPr>
+          <p:cNvPr id="9" name="Group 8">
+            <a:extLst>
+              <a:ext uri="{FF2B5EF4-FFF2-40B4-BE49-F238E27FC236}">
+                <a16:creationId xmlns:a16="http://schemas.microsoft.com/office/drawing/2014/main" id="{1F5F76A4-293C-D908-2052-E3426A0C13BF}"/>
+              </a:ext>
+            </a:extLst>
+          </p:cNvPr>
+          <p:cNvGrpSpPr/>
+          <p:nvPr/>
+        </p:nvGrpSpPr>
+        <p:grpSpPr>
+          <a:xfrm>
+            <a:off x="11296650" y="182642"/>
+            <a:ext cx="904830" cy="1090894"/>
+            <a:chOff x="11296650" y="182642"/>
+            <a:chExt cx="904830" cy="1090894"/>
+          </a:xfrm>
+        </p:grpSpPr>
+        <p:pic>
+          <p:nvPicPr>
+            <p:cNvPr id="10" name="Picture 2" descr="American Community Survey (ACS) – Roadmap to the 2030 Census">
+              <a:extLst>
+                <a:ext uri="{FF2B5EF4-FFF2-40B4-BE49-F238E27FC236}">
+                  <a16:creationId xmlns:a16="http://schemas.microsoft.com/office/drawing/2014/main" id="{BBF3C708-A389-1325-B859-8D8400A97113}"/>
+                </a:ext>
+              </a:extLst>
+            </p:cNvPr>
+            <p:cNvPicPr>
+              <a:picLocks noChangeAspect="1" noChangeArrowheads="1"/>
+            </p:cNvPicPr>
+            <p:nvPr/>
+          </p:nvPicPr>
+          <p:blipFill>
+            <a:blip r:embed="rId4">
+              <a:extLst>
+                <a:ext uri="{28A0092B-C50C-407E-A947-70E740481C1C}">
+                  <a14:useLocalDpi xmlns:a14="http://schemas.microsoft.com/office/drawing/2010/main" val="0"/>
+                </a:ext>
+              </a:extLst>
+            </a:blip>
+            <a:srcRect/>
+            <a:stretch>
+              <a:fillRect/>
+            </a:stretch>
+          </p:blipFill>
+          <p:spPr bwMode="auto">
+            <a:xfrm>
+              <a:off x="11308814" y="182642"/>
+              <a:ext cx="750376" cy="750376"/>
+            </a:xfrm>
+            <a:prstGeom prst="rect">
+              <a:avLst/>
+            </a:prstGeom>
+            <a:noFill/>
+            <a:extLst>
+              <a:ext uri="{909E8E84-426E-40DD-AFC4-6F175D3DCCD1}">
+                <a14:hiddenFill xmlns:a14="http://schemas.microsoft.com/office/drawing/2010/main">
+                  <a:solidFill>
+                    <a:srgbClr val="FFFFFF"/>
+                  </a:solidFill>
+                </a14:hiddenFill>
+              </a:ext>
+            </a:extLst>
+          </p:spPr>
+        </p:pic>
+        <p:sp>
+          <p:nvSpPr>
+            <p:cNvPr id="11" name="TextBox 10">
+              <a:extLst>
+                <a:ext uri="{FF2B5EF4-FFF2-40B4-BE49-F238E27FC236}">
+                  <a16:creationId xmlns:a16="http://schemas.microsoft.com/office/drawing/2014/main" id="{49681A25-A2B8-53D1-2193-561225C9BA41}"/>
+                </a:ext>
+              </a:extLst>
+            </p:cNvPr>
+            <p:cNvSpPr txBox="1"/>
+            <p:nvPr/>
+          </p:nvSpPr>
+          <p:spPr>
+            <a:xfrm>
+              <a:off x="11296650" y="934982"/>
+              <a:ext cx="904830" cy="338554"/>
+            </a:xfrm>
+            <a:prstGeom prst="rect">
+              <a:avLst/>
+            </a:prstGeom>
+            <a:noFill/>
+          </p:spPr>
+          <p:txBody>
+            <a:bodyPr wrap="square" rtlCol="0">
+              <a:spAutoFit/>
+            </a:bodyPr>
+            <a:lstStyle/>
+            <a:p>
+              <a:r>
+                <a:rPr lang="en-US" sz="1600" dirty="0">
+                  <a:latin typeface="Abadi MT Condensed Light" panose="020B0306030101010103" pitchFamily="34" charset="77"/>
+                </a:rPr>
+                <a:t>2016-20</a:t>
+              </a:r>
+              <a:endParaRPr lang="en-US" dirty="0">
+                <a:latin typeface="Abadi MT Condensed Light" panose="020B0306030101010103" pitchFamily="34" charset="77"/>
+              </a:endParaRPr>
+            </a:p>
+          </p:txBody>
+        </p:sp>
+      </p:grpSp>
     </p:spTree>
     <p:extLst>
       <p:ext uri="{BB962C8B-B14F-4D97-AF65-F5344CB8AC3E}">
@@ -6527,8 +6868,8 @@
         </p:nvSpPr>
         <p:spPr>
           <a:xfrm>
-            <a:off x="11299066" y="894258"/>
-            <a:ext cx="704294" cy="338554"/>
+            <a:off x="11180362" y="914686"/>
+            <a:ext cx="904830" cy="338554"/>
           </a:xfrm>
           <a:prstGeom prst="rect">
             <a:avLst/>
@@ -6545,7 +6886,7 @@
               <a:rPr lang="en-US" sz="1600" dirty="0">
                 <a:latin typeface="Abadi MT Condensed Light" panose="020B0306030101010103" pitchFamily="34" charset="77"/>
               </a:rPr>
-              <a:t>2020</a:t>
+              <a:t>2008-10</a:t>
             </a:r>
             <a:endParaRPr lang="en-US" dirty="0">
               <a:latin typeface="Abadi MT Condensed Light" panose="020B0306030101010103" pitchFamily="34" charset="77"/>
@@ -6715,12 +7056,70 @@
           </a:p>
         </p:txBody>
       </p:sp>
+      <p:pic>
+        <p:nvPicPr>
+          <p:cNvPr id="10" name="Picture 9">
+            <a:extLst>
+              <a:ext uri="{FF2B5EF4-FFF2-40B4-BE49-F238E27FC236}">
+                <a16:creationId xmlns:a16="http://schemas.microsoft.com/office/drawing/2014/main" id="{FE02F409-2D7B-8138-8751-7DE5A754EDAF}"/>
+              </a:ext>
+            </a:extLst>
+          </p:cNvPr>
+          <p:cNvPicPr>
+            <a:picLocks noChangeAspect="1"/>
+          </p:cNvPicPr>
+          <p:nvPr/>
+        </p:nvPicPr>
+        <p:blipFill>
+          <a:blip r:embed="rId3"/>
+          <a:srcRect/>
+          <a:stretch/>
+        </p:blipFill>
+        <p:spPr>
+          <a:xfrm>
+            <a:off x="165406" y="2123868"/>
+            <a:ext cx="5851915" cy="4551490"/>
+          </a:xfrm>
+          <a:prstGeom prst="rect">
+            <a:avLst/>
+          </a:prstGeom>
+        </p:spPr>
+      </p:pic>
+      <p:pic>
+        <p:nvPicPr>
+          <p:cNvPr id="11" name="Picture 10">
+            <a:extLst>
+              <a:ext uri="{FF2B5EF4-FFF2-40B4-BE49-F238E27FC236}">
+                <a16:creationId xmlns:a16="http://schemas.microsoft.com/office/drawing/2014/main" id="{4B30DD27-E1A1-1370-C3DF-FA3BF8F8F358}"/>
+              </a:ext>
+            </a:extLst>
+          </p:cNvPr>
+          <p:cNvPicPr>
+            <a:picLocks noChangeAspect="1"/>
+          </p:cNvPicPr>
+          <p:nvPr/>
+        </p:nvPicPr>
+        <p:blipFill>
+          <a:blip r:embed="rId4"/>
+          <a:srcRect/>
+          <a:stretch/>
+        </p:blipFill>
+        <p:spPr>
+          <a:xfrm>
+            <a:off x="6174678" y="2123868"/>
+            <a:ext cx="5851915" cy="4551489"/>
+          </a:xfrm>
+          <a:prstGeom prst="rect">
+            <a:avLst/>
+          </a:prstGeom>
+        </p:spPr>
+      </p:pic>
       <p:grpSp>
         <p:nvGrpSpPr>
-          <p:cNvPr id="6" name="Group 5">
-            <a:extLst>
-              <a:ext uri="{FF2B5EF4-FFF2-40B4-BE49-F238E27FC236}">
-                <a16:creationId xmlns:a16="http://schemas.microsoft.com/office/drawing/2014/main" id="{3F0DC971-75D8-CEB8-94BD-1F189E286CF4}"/>
+          <p:cNvPr id="12" name="Group 11">
+            <a:extLst>
+              <a:ext uri="{FF2B5EF4-FFF2-40B4-BE49-F238E27FC236}">
+                <a16:creationId xmlns:a16="http://schemas.microsoft.com/office/drawing/2014/main" id="{7C9E2573-BFD8-07E0-20B8-CA31BC968332}"/>
               </a:ext>
             </a:extLst>
           </p:cNvPr>
@@ -6729,18 +7128,18 @@
         </p:nvGrpSpPr>
         <p:grpSpPr>
           <a:xfrm>
-            <a:off x="11286858" y="114427"/>
-            <a:ext cx="796458" cy="1088930"/>
-            <a:chOff x="10951180" y="240224"/>
-            <a:chExt cx="796458" cy="1088930"/>
+            <a:off x="11296650" y="182642"/>
+            <a:ext cx="904830" cy="1090894"/>
+            <a:chOff x="11296650" y="182642"/>
+            <a:chExt cx="904830" cy="1090894"/>
           </a:xfrm>
         </p:grpSpPr>
         <p:pic>
           <p:nvPicPr>
-            <p:cNvPr id="8" name="Picture 2" descr="American Community Survey (ACS) – Roadmap to the 2030 Census">
+            <p:cNvPr id="13" name="Picture 2" descr="American Community Survey (ACS) – Roadmap to the 2030 Census">
               <a:extLst>
                 <a:ext uri="{FF2B5EF4-FFF2-40B4-BE49-F238E27FC236}">
-                  <a16:creationId xmlns:a16="http://schemas.microsoft.com/office/drawing/2014/main" id="{729B9A9A-F980-8077-C9EA-84C1567A8040}"/>
+                  <a16:creationId xmlns:a16="http://schemas.microsoft.com/office/drawing/2014/main" id="{B77A0F5B-AAC8-8410-AAC9-4D104BCE1852}"/>
                 </a:ext>
               </a:extLst>
             </p:cNvPr>
@@ -6750,7 +7149,7 @@
             <p:nvPr/>
           </p:nvPicPr>
           <p:blipFill>
-            <a:blip r:embed="rId3">
+            <a:blip r:embed="rId5">
               <a:extLst>
                 <a:ext uri="{28A0092B-C50C-407E-A947-70E740481C1C}">
                   <a14:useLocalDpi xmlns:a14="http://schemas.microsoft.com/office/drawing/2010/main" val="0"/>
@@ -6764,7 +7163,7 @@
           </p:blipFill>
           <p:spPr bwMode="auto">
             <a:xfrm>
-              <a:off x="10951180" y="240224"/>
+              <a:off x="11308814" y="182642"/>
               <a:ext cx="750376" cy="750376"/>
             </a:xfrm>
             <a:prstGeom prst="rect">
@@ -6784,10 +7183,10 @@
         </p:pic>
         <p:sp>
           <p:nvSpPr>
-            <p:cNvPr id="9" name="TextBox 8">
+            <p:cNvPr id="14" name="TextBox 13">
               <a:extLst>
                 <a:ext uri="{FF2B5EF4-FFF2-40B4-BE49-F238E27FC236}">
-                  <a16:creationId xmlns:a16="http://schemas.microsoft.com/office/drawing/2014/main" id="{DFE456F3-8ED0-A469-4093-F7DDB3E36480}"/>
+                  <a16:creationId xmlns:a16="http://schemas.microsoft.com/office/drawing/2014/main" id="{04AE5A0F-8EB3-F818-1D23-B783E7DE5079}"/>
                 </a:ext>
               </a:extLst>
             </p:cNvPr>
@@ -6796,8 +7195,8 @@
           </p:nvSpPr>
           <p:spPr>
             <a:xfrm>
-              <a:off x="11043344" y="990600"/>
-              <a:ext cx="704294" cy="338554"/>
+              <a:off x="11296650" y="934982"/>
+              <a:ext cx="904830" cy="338554"/>
             </a:xfrm>
             <a:prstGeom prst="rect">
               <a:avLst/>
@@ -6814,71 +7213,15 @@
                 <a:rPr lang="en-US" sz="1600" dirty="0">
                   <a:latin typeface="Abadi MT Condensed Light" panose="020B0306030101010103" pitchFamily="34" charset="77"/>
                 </a:rPr>
-                <a:t>2020</a:t>
+                <a:t>2016-20</a:t>
               </a:r>
-              <a:endParaRPr lang="en-US" dirty="0"/>
+              <a:endParaRPr lang="en-US" dirty="0">
+                <a:latin typeface="Abadi MT Condensed Light" panose="020B0306030101010103" pitchFamily="34" charset="77"/>
+              </a:endParaRPr>
             </a:p>
           </p:txBody>
         </p:sp>
       </p:grpSp>
-      <p:pic>
-        <p:nvPicPr>
-          <p:cNvPr id="10" name="Picture 9">
-            <a:extLst>
-              <a:ext uri="{FF2B5EF4-FFF2-40B4-BE49-F238E27FC236}">
-                <a16:creationId xmlns:a16="http://schemas.microsoft.com/office/drawing/2014/main" id="{FE02F409-2D7B-8138-8751-7DE5A754EDAF}"/>
-              </a:ext>
-            </a:extLst>
-          </p:cNvPr>
-          <p:cNvPicPr>
-            <a:picLocks noChangeAspect="1"/>
-          </p:cNvPicPr>
-          <p:nvPr/>
-        </p:nvPicPr>
-        <p:blipFill>
-          <a:blip r:embed="rId4"/>
-          <a:srcRect/>
-          <a:stretch/>
-        </p:blipFill>
-        <p:spPr>
-          <a:xfrm>
-            <a:off x="165406" y="2123868"/>
-            <a:ext cx="5851915" cy="4551490"/>
-          </a:xfrm>
-          <a:prstGeom prst="rect">
-            <a:avLst/>
-          </a:prstGeom>
-        </p:spPr>
-      </p:pic>
-      <p:pic>
-        <p:nvPicPr>
-          <p:cNvPr id="11" name="Picture 10">
-            <a:extLst>
-              <a:ext uri="{FF2B5EF4-FFF2-40B4-BE49-F238E27FC236}">
-                <a16:creationId xmlns:a16="http://schemas.microsoft.com/office/drawing/2014/main" id="{4B30DD27-E1A1-1370-C3DF-FA3BF8F8F358}"/>
-              </a:ext>
-            </a:extLst>
-          </p:cNvPr>
-          <p:cNvPicPr>
-            <a:picLocks noChangeAspect="1"/>
-          </p:cNvPicPr>
-          <p:nvPr/>
-        </p:nvPicPr>
-        <p:blipFill>
-          <a:blip r:embed="rId5"/>
-          <a:srcRect/>
-          <a:stretch/>
-        </p:blipFill>
-        <p:spPr>
-          <a:xfrm>
-            <a:off x="6174678" y="2123868"/>
-            <a:ext cx="5851915" cy="4551489"/>
-          </a:xfrm>
-          <a:prstGeom prst="rect">
-            <a:avLst/>
-          </a:prstGeom>
-        </p:spPr>
-      </p:pic>
     </p:spTree>
     <p:extLst>
       <p:ext uri="{BB962C8B-B14F-4D97-AF65-F5344CB8AC3E}">
@@ -7012,6 +7355,93 @@
           </a:prstGeom>
         </p:spPr>
       </p:pic>
+      <p:pic>
+        <p:nvPicPr>
+          <p:cNvPr id="6" name="Picture 5" descr="American Community Survey (ACS) – Roadmap to the 2030 Census">
+            <a:extLst>
+              <a:ext uri="{FF2B5EF4-FFF2-40B4-BE49-F238E27FC236}">
+                <a16:creationId xmlns:a16="http://schemas.microsoft.com/office/drawing/2014/main" id="{0F94385F-C9BD-A804-C948-F31FB2B738B5}"/>
+              </a:ext>
+            </a:extLst>
+          </p:cNvPr>
+          <p:cNvPicPr>
+            <a:picLocks noChangeAspect="1" noChangeArrowheads="1"/>
+          </p:cNvPicPr>
+          <p:nvPr/>
+        </p:nvPicPr>
+        <p:blipFill>
+          <a:blip r:embed="rId4">
+            <a:extLst>
+              <a:ext uri="{28A0092B-C50C-407E-A947-70E740481C1C}">
+                <a14:useLocalDpi xmlns:a14="http://schemas.microsoft.com/office/drawing/2010/main" val="0"/>
+              </a:ext>
+            </a:extLst>
+          </a:blip>
+          <a:srcRect/>
+          <a:stretch>
+            <a:fillRect/>
+          </a:stretch>
+        </p:blipFill>
+        <p:spPr bwMode="auto">
+          <a:xfrm>
+            <a:off x="11214652" y="132392"/>
+            <a:ext cx="750376" cy="750376"/>
+          </a:xfrm>
+          <a:prstGeom prst="rect">
+            <a:avLst/>
+          </a:prstGeom>
+          <a:noFill/>
+          <a:extLst>
+            <a:ext uri="{909E8E84-426E-40DD-AFC4-6F175D3DCCD1}">
+              <a14:hiddenFill xmlns:a14="http://schemas.microsoft.com/office/drawing/2010/main">
+                <a:solidFill>
+                  <a:srgbClr val="FFFFFF"/>
+                </a:solidFill>
+              </a14:hiddenFill>
+            </a:ext>
+          </a:extLst>
+        </p:spPr>
+      </p:pic>
+      <p:sp>
+        <p:nvSpPr>
+          <p:cNvPr id="7" name="TextBox 6">
+            <a:extLst>
+              <a:ext uri="{FF2B5EF4-FFF2-40B4-BE49-F238E27FC236}">
+                <a16:creationId xmlns:a16="http://schemas.microsoft.com/office/drawing/2014/main" id="{9AD79318-2819-87CA-1944-9C203CA65AFB}"/>
+              </a:ext>
+            </a:extLst>
+          </p:cNvPr>
+          <p:cNvSpPr txBox="1"/>
+          <p:nvPr/>
+        </p:nvSpPr>
+        <p:spPr>
+          <a:xfrm>
+            <a:off x="11180362" y="914686"/>
+            <a:ext cx="904830" cy="338554"/>
+          </a:xfrm>
+          <a:prstGeom prst="rect">
+            <a:avLst/>
+          </a:prstGeom>
+          <a:noFill/>
+        </p:spPr>
+        <p:txBody>
+          <a:bodyPr wrap="square" rtlCol="0">
+            <a:spAutoFit/>
+          </a:bodyPr>
+          <a:lstStyle/>
+          <a:p>
+            <a:r>
+              <a:rPr lang="en-US" sz="1600" dirty="0">
+                <a:latin typeface="Abadi MT Condensed Light" panose="020B0306030101010103" pitchFamily="34" charset="77"/>
+              </a:rPr>
+              <a:t>2008-10</a:t>
+            </a:r>
+            <a:endParaRPr lang="en-US" dirty="0">
+              <a:latin typeface="Abadi MT Condensed Light" panose="020B0306030101010103" pitchFamily="34" charset="77"/>
+            </a:endParaRPr>
+          </a:p>
+        </p:txBody>
+      </p:sp>
     </p:spTree>
     <p:extLst>
       <p:ext uri="{BB962C8B-B14F-4D97-AF65-F5344CB8AC3E}">
@@ -7095,7 +7525,7 @@
         </p:nvSpPr>
         <p:spPr>
           <a:xfrm>
-            <a:off x="5004816" y="1140897"/>
+            <a:off x="5004816" y="985666"/>
             <a:ext cx="2182368" cy="369332"/>
           </a:xfrm>
           <a:prstGeom prst="rect">
@@ -7145,6 +7575,93 @@
           </a:prstGeom>
         </p:spPr>
       </p:pic>
+      <p:pic>
+        <p:nvPicPr>
+          <p:cNvPr id="5" name="Picture 4" descr="American Community Survey (ACS) – Roadmap to the 2030 Census">
+            <a:extLst>
+              <a:ext uri="{FF2B5EF4-FFF2-40B4-BE49-F238E27FC236}">
+                <a16:creationId xmlns:a16="http://schemas.microsoft.com/office/drawing/2014/main" id="{0C5151A4-C2C1-0D33-928D-4509A0193BA9}"/>
+              </a:ext>
+            </a:extLst>
+          </p:cNvPr>
+          <p:cNvPicPr>
+            <a:picLocks noChangeAspect="1" noChangeArrowheads="1"/>
+          </p:cNvPicPr>
+          <p:nvPr/>
+        </p:nvPicPr>
+        <p:blipFill>
+          <a:blip r:embed="rId4">
+            <a:extLst>
+              <a:ext uri="{28A0092B-C50C-407E-A947-70E740481C1C}">
+                <a14:useLocalDpi xmlns:a14="http://schemas.microsoft.com/office/drawing/2010/main" val="0"/>
+              </a:ext>
+            </a:extLst>
+          </a:blip>
+          <a:srcRect/>
+          <a:stretch>
+            <a:fillRect/>
+          </a:stretch>
+        </p:blipFill>
+        <p:spPr bwMode="auto">
+          <a:xfrm>
+            <a:off x="11214652" y="132392"/>
+            <a:ext cx="750376" cy="750376"/>
+          </a:xfrm>
+          <a:prstGeom prst="rect">
+            <a:avLst/>
+          </a:prstGeom>
+          <a:noFill/>
+          <a:extLst>
+            <a:ext uri="{909E8E84-426E-40DD-AFC4-6F175D3DCCD1}">
+              <a14:hiddenFill xmlns:a14="http://schemas.microsoft.com/office/drawing/2010/main">
+                <a:solidFill>
+                  <a:srgbClr val="FFFFFF"/>
+                </a:solidFill>
+              </a14:hiddenFill>
+            </a:ext>
+          </a:extLst>
+        </p:spPr>
+      </p:pic>
+      <p:sp>
+        <p:nvSpPr>
+          <p:cNvPr id="7" name="TextBox 6">
+            <a:extLst>
+              <a:ext uri="{FF2B5EF4-FFF2-40B4-BE49-F238E27FC236}">
+                <a16:creationId xmlns:a16="http://schemas.microsoft.com/office/drawing/2014/main" id="{B974C7A4-D242-2E3C-C372-378718665824}"/>
+              </a:ext>
+            </a:extLst>
+          </p:cNvPr>
+          <p:cNvSpPr txBox="1"/>
+          <p:nvPr/>
+        </p:nvSpPr>
+        <p:spPr>
+          <a:xfrm>
+            <a:off x="11180362" y="914686"/>
+            <a:ext cx="904830" cy="338554"/>
+          </a:xfrm>
+          <a:prstGeom prst="rect">
+            <a:avLst/>
+          </a:prstGeom>
+          <a:noFill/>
+        </p:spPr>
+        <p:txBody>
+          <a:bodyPr wrap="square" rtlCol="0">
+            <a:spAutoFit/>
+          </a:bodyPr>
+          <a:lstStyle/>
+          <a:p>
+            <a:r>
+              <a:rPr lang="en-US" sz="1600" dirty="0">
+                <a:latin typeface="Abadi MT Condensed Light" panose="020B0306030101010103" pitchFamily="34" charset="77"/>
+              </a:rPr>
+              <a:t>2008-10</a:t>
+            </a:r>
+            <a:endParaRPr lang="en-US" dirty="0">
+              <a:latin typeface="Abadi MT Condensed Light" panose="020B0306030101010103" pitchFamily="34" charset="77"/>
+            </a:endParaRPr>
+          </a:p>
+        </p:txBody>
+      </p:sp>
     </p:spTree>
     <p:extLst>
       <p:ext uri="{BB962C8B-B14F-4D97-AF65-F5344CB8AC3E}">
@@ -7989,7 +8506,12 @@
             <p:ph idx="1"/>
           </p:nvPr>
         </p:nvSpPr>
-        <p:spPr/>
+        <p:spPr>
+          <a:xfrm>
+            <a:off x="838200" y="1604244"/>
+            <a:ext cx="10515600" cy="4351338"/>
+          </a:xfrm>
+        </p:spPr>
         <p:txBody>
           <a:bodyPr/>
           <a:lstStyle/>
@@ -8002,7 +8524,7 @@
           <a:p>
             <a:r>
               <a:rPr lang="en-US" dirty="0"/>
-              <a:t>But Caribbean </a:t>
+              <a:t>Caribbean </a:t>
             </a:r>
             <a:r>
               <a:rPr lang="en-US" dirty="0" err="1"/>
@@ -8032,7 +8554,7 @@
         </p:nvGrpSpPr>
         <p:grpSpPr>
           <a:xfrm>
-            <a:off x="2146515" y="2812171"/>
+            <a:off x="2175391" y="2600415"/>
             <a:ext cx="8020373" cy="4351337"/>
             <a:chOff x="254000" y="3529739"/>
             <a:chExt cx="6238067" cy="3119033"/>
@@ -8053,7 +8575,7 @@
             <p:nvPr/>
           </p:nvPicPr>
           <p:blipFill>
-            <a:blip r:embed="rId3"/>
+            <a:blip r:embed="rId4"/>
             <a:srcRect/>
             <a:stretch/>
           </p:blipFill>
@@ -8128,7 +8650,7 @@
           </p:nvSpPr>
           <p:spPr>
             <a:xfrm>
-              <a:off x="3874579" y="4409957"/>
+              <a:off x="4016819" y="4425375"/>
               <a:ext cx="914400" cy="369332"/>
             </a:xfrm>
             <a:prstGeom prst="rect">
@@ -8163,7 +8685,7 @@
           </p:nvSpPr>
           <p:spPr>
             <a:xfrm>
-              <a:off x="984790" y="4409957"/>
+              <a:off x="1029814" y="4432133"/>
               <a:ext cx="914400" cy="369332"/>
             </a:xfrm>
             <a:prstGeom prst="rect">
@@ -8195,6 +8717,11 @@
   <p:clrMapOvr>
     <a:masterClrMapping/>
   </p:clrMapOvr>
+  <p:extLst>
+    <p:ext uri="{6950BFC3-D8DA-4A85-94F7-54DA5524770B}">
+      <p188:commentRel xmlns:p188="http://schemas.microsoft.com/office/powerpoint/2018/8/main" r:id="rId3"/>
+    </p:ext>
+  </p:extLst>
 </p:sld>
 </file>
 
@@ -9563,7 +10090,7 @@
           <p:nvPr/>
         </p:nvPicPr>
         <p:blipFill>
-          <a:blip r:embed="rId3"/>
+          <a:blip r:embed="rId4"/>
           <a:stretch>
             <a:fillRect/>
           </a:stretch>
@@ -9634,6 +10161,89 @@
   <p:clrMapOvr>
     <a:masterClrMapping/>
   </p:clrMapOvr>
+  <p:timing>
+    <p:tnLst>
+      <p:par>
+        <p:cTn id="1" dur="indefinite" restart="never" nodeType="tmRoot">
+          <p:childTnLst>
+            <p:seq concurrent="1" nextAc="seek">
+              <p:cTn id="2" dur="indefinite" nodeType="mainSeq">
+                <p:childTnLst>
+                  <p:par>
+                    <p:cTn id="3" fill="hold">
+                      <p:stCondLst>
+                        <p:cond delay="indefinite"/>
+                      </p:stCondLst>
+                      <p:childTnLst>
+                        <p:par>
+                          <p:cTn id="4" fill="hold">
+                            <p:stCondLst>
+                              <p:cond delay="0"/>
+                            </p:stCondLst>
+                            <p:childTnLst>
+                              <p:par>
+                                <p:cTn id="5" presetID="1" presetClass="entr" presetSubtype="0" fill="hold" grpId="0" nodeType="clickEffect">
+                                  <p:stCondLst>
+                                    <p:cond delay="0"/>
+                                  </p:stCondLst>
+                                  <p:childTnLst>
+                                    <p:set>
+                                      <p:cBhvr>
+                                        <p:cTn id="6" dur="1" fill="hold">
+                                          <p:stCondLst>
+                                            <p:cond delay="0"/>
+                                          </p:stCondLst>
+                                        </p:cTn>
+                                        <p:tgtEl>
+                                          <p:spTgt spid="4"/>
+                                        </p:tgtEl>
+                                        <p:attrNameLst>
+                                          <p:attrName>style.visibility</p:attrName>
+                                        </p:attrNameLst>
+                                      </p:cBhvr>
+                                      <p:to>
+                                        <p:strVal val="visible"/>
+                                      </p:to>
+                                    </p:set>
+                                  </p:childTnLst>
+                                </p:cTn>
+                              </p:par>
+                            </p:childTnLst>
+                          </p:cTn>
+                        </p:par>
+                      </p:childTnLst>
+                    </p:cTn>
+                  </p:par>
+                </p:childTnLst>
+              </p:cTn>
+              <p:prevCondLst>
+                <p:cond evt="onPrev" delay="0">
+                  <p:tgtEl>
+                    <p:sldTgt/>
+                  </p:tgtEl>
+                </p:cond>
+              </p:prevCondLst>
+              <p:nextCondLst>
+                <p:cond evt="onNext" delay="0">
+                  <p:tgtEl>
+                    <p:sldTgt/>
+                  </p:tgtEl>
+                </p:cond>
+              </p:nextCondLst>
+            </p:seq>
+          </p:childTnLst>
+        </p:cTn>
+      </p:par>
+    </p:tnLst>
+    <p:bldLst>
+      <p:bldP spid="4" grpId="0" animBg="1"/>
+    </p:bldLst>
+  </p:timing>
+  <p:extLst>
+    <p:ext uri="{6950BFC3-D8DA-4A85-94F7-54DA5524770B}">
+      <p188:commentRel xmlns:p188="http://schemas.microsoft.com/office/powerpoint/2018/8/main" r:id="rId3"/>
+    </p:ext>
+  </p:extLst>
 </p:sld>
 </file>
 
@@ -9718,12 +10328,8 @@
           <a:p>
             <a:pPr lvl="1"/>
             <a:r>
-              <a:rPr lang="en-US" dirty="0" err="1"/>
-              <a:t>Eg</a:t>
-            </a:r>
-            <a:r>
-              <a:rPr lang="en-US" dirty="0"/>
-              <a:t> using NHIS to look at morbidity differences smaller samples though</a:t>
+              <a:rPr lang="en-US" dirty="0"/>
+              <a:t>E.g., using NHIS to look at morbidity differences smaller samples though</a:t>
             </a:r>
           </a:p>
           <a:p>
@@ -9781,6 +10387,307 @@
   <p:clrMapOvr>
     <a:masterClrMapping/>
   </p:clrMapOvr>
+  <p:timing>
+    <p:tnLst>
+      <p:par>
+        <p:cTn id="1" dur="indefinite" restart="never" nodeType="tmRoot">
+          <p:childTnLst>
+            <p:seq concurrent="1" nextAc="seek">
+              <p:cTn id="2" dur="indefinite" nodeType="mainSeq">
+                <p:childTnLst>
+                  <p:par>
+                    <p:cTn id="3" fill="hold">
+                      <p:stCondLst>
+                        <p:cond delay="indefinite"/>
+                      </p:stCondLst>
+                      <p:childTnLst>
+                        <p:par>
+                          <p:cTn id="4" fill="hold">
+                            <p:stCondLst>
+                              <p:cond delay="0"/>
+                            </p:stCondLst>
+                            <p:childTnLst>
+                              <p:par>
+                                <p:cTn id="5" presetID="1" presetClass="entr" presetSubtype="0" fill="hold" nodeType="clickEffect">
+                                  <p:stCondLst>
+                                    <p:cond delay="0"/>
+                                  </p:stCondLst>
+                                  <p:childTnLst>
+                                    <p:set>
+                                      <p:cBhvr>
+                                        <p:cTn id="6" dur="1" fill="hold">
+                                          <p:stCondLst>
+                                            <p:cond delay="0"/>
+                                          </p:stCondLst>
+                                        </p:cTn>
+                                        <p:tgtEl>
+                                          <p:spTgt spid="3">
+                                            <p:txEl>
+                                              <p:pRg st="1" end="1"/>
+                                            </p:txEl>
+                                          </p:spTgt>
+                                        </p:tgtEl>
+                                        <p:attrNameLst>
+                                          <p:attrName>style.visibility</p:attrName>
+                                        </p:attrNameLst>
+                                      </p:cBhvr>
+                                      <p:to>
+                                        <p:strVal val="visible"/>
+                                      </p:to>
+                                    </p:set>
+                                  </p:childTnLst>
+                                </p:cTn>
+                              </p:par>
+                            </p:childTnLst>
+                          </p:cTn>
+                        </p:par>
+                      </p:childTnLst>
+                    </p:cTn>
+                  </p:par>
+                  <p:par>
+                    <p:cTn id="7" fill="hold">
+                      <p:stCondLst>
+                        <p:cond delay="indefinite"/>
+                      </p:stCondLst>
+                      <p:childTnLst>
+                        <p:par>
+                          <p:cTn id="8" fill="hold">
+                            <p:stCondLst>
+                              <p:cond delay="0"/>
+                            </p:stCondLst>
+                            <p:childTnLst>
+                              <p:par>
+                                <p:cTn id="9" presetID="1" presetClass="entr" presetSubtype="0" fill="hold" nodeType="clickEffect">
+                                  <p:stCondLst>
+                                    <p:cond delay="0"/>
+                                  </p:stCondLst>
+                                  <p:childTnLst>
+                                    <p:set>
+                                      <p:cBhvr>
+                                        <p:cTn id="10" dur="1" fill="hold">
+                                          <p:stCondLst>
+                                            <p:cond delay="0"/>
+                                          </p:stCondLst>
+                                        </p:cTn>
+                                        <p:tgtEl>
+                                          <p:spTgt spid="3">
+                                            <p:txEl>
+                                              <p:pRg st="2" end="2"/>
+                                            </p:txEl>
+                                          </p:spTgt>
+                                        </p:tgtEl>
+                                        <p:attrNameLst>
+                                          <p:attrName>style.visibility</p:attrName>
+                                        </p:attrNameLst>
+                                      </p:cBhvr>
+                                      <p:to>
+                                        <p:strVal val="visible"/>
+                                      </p:to>
+                                    </p:set>
+                                  </p:childTnLst>
+                                </p:cTn>
+                              </p:par>
+                            </p:childTnLst>
+                          </p:cTn>
+                        </p:par>
+                      </p:childTnLst>
+                    </p:cTn>
+                  </p:par>
+                  <p:par>
+                    <p:cTn id="11" fill="hold">
+                      <p:stCondLst>
+                        <p:cond delay="indefinite"/>
+                      </p:stCondLst>
+                      <p:childTnLst>
+                        <p:par>
+                          <p:cTn id="12" fill="hold">
+                            <p:stCondLst>
+                              <p:cond delay="0"/>
+                            </p:stCondLst>
+                            <p:childTnLst>
+                              <p:par>
+                                <p:cTn id="13" presetID="1" presetClass="entr" presetSubtype="0" fill="hold" nodeType="clickEffect">
+                                  <p:stCondLst>
+                                    <p:cond delay="0"/>
+                                  </p:stCondLst>
+                                  <p:childTnLst>
+                                    <p:set>
+                                      <p:cBhvr>
+                                        <p:cTn id="14" dur="1" fill="hold">
+                                          <p:stCondLst>
+                                            <p:cond delay="0"/>
+                                          </p:stCondLst>
+                                        </p:cTn>
+                                        <p:tgtEl>
+                                          <p:spTgt spid="3">
+                                            <p:txEl>
+                                              <p:pRg st="3" end="3"/>
+                                            </p:txEl>
+                                          </p:spTgt>
+                                        </p:tgtEl>
+                                        <p:attrNameLst>
+                                          <p:attrName>style.visibility</p:attrName>
+                                        </p:attrNameLst>
+                                      </p:cBhvr>
+                                      <p:to>
+                                        <p:strVal val="visible"/>
+                                      </p:to>
+                                    </p:set>
+                                  </p:childTnLst>
+                                </p:cTn>
+                              </p:par>
+                              <p:par>
+                                <p:cTn id="15" presetID="1" presetClass="entr" presetSubtype="0" fill="hold" nodeType="withEffect">
+                                  <p:stCondLst>
+                                    <p:cond delay="0"/>
+                                  </p:stCondLst>
+                                  <p:childTnLst>
+                                    <p:set>
+                                      <p:cBhvr>
+                                        <p:cTn id="16" dur="1" fill="hold">
+                                          <p:stCondLst>
+                                            <p:cond delay="0"/>
+                                          </p:stCondLst>
+                                        </p:cTn>
+                                        <p:tgtEl>
+                                          <p:spTgt spid="3">
+                                            <p:txEl>
+                                              <p:pRg st="4" end="4"/>
+                                            </p:txEl>
+                                          </p:spTgt>
+                                        </p:tgtEl>
+                                        <p:attrNameLst>
+                                          <p:attrName>style.visibility</p:attrName>
+                                        </p:attrNameLst>
+                                      </p:cBhvr>
+                                      <p:to>
+                                        <p:strVal val="visible"/>
+                                      </p:to>
+                                    </p:set>
+                                  </p:childTnLst>
+                                </p:cTn>
+                              </p:par>
+                              <p:par>
+                                <p:cTn id="17" presetID="1" presetClass="entr" presetSubtype="0" fill="hold" nodeType="withEffect">
+                                  <p:stCondLst>
+                                    <p:cond delay="0"/>
+                                  </p:stCondLst>
+                                  <p:childTnLst>
+                                    <p:set>
+                                      <p:cBhvr>
+                                        <p:cTn id="18" dur="1" fill="hold">
+                                          <p:stCondLst>
+                                            <p:cond delay="0"/>
+                                          </p:stCondLst>
+                                        </p:cTn>
+                                        <p:tgtEl>
+                                          <p:spTgt spid="3">
+                                            <p:txEl>
+                                              <p:pRg st="5" end="5"/>
+                                            </p:txEl>
+                                          </p:spTgt>
+                                        </p:tgtEl>
+                                        <p:attrNameLst>
+                                          <p:attrName>style.visibility</p:attrName>
+                                        </p:attrNameLst>
+                                      </p:cBhvr>
+                                      <p:to>
+                                        <p:strVal val="visible"/>
+                                      </p:to>
+                                    </p:set>
+                                  </p:childTnLst>
+                                </p:cTn>
+                              </p:par>
+                              <p:par>
+                                <p:cTn id="19" presetID="1" presetClass="entr" presetSubtype="0" fill="hold" nodeType="withEffect">
+                                  <p:stCondLst>
+                                    <p:cond delay="0"/>
+                                  </p:stCondLst>
+                                  <p:childTnLst>
+                                    <p:set>
+                                      <p:cBhvr>
+                                        <p:cTn id="20" dur="1" fill="hold">
+                                          <p:stCondLst>
+                                            <p:cond delay="0"/>
+                                          </p:stCondLst>
+                                        </p:cTn>
+                                        <p:tgtEl>
+                                          <p:spTgt spid="3">
+                                            <p:txEl>
+                                              <p:pRg st="6" end="6"/>
+                                            </p:txEl>
+                                          </p:spTgt>
+                                        </p:tgtEl>
+                                        <p:attrNameLst>
+                                          <p:attrName>style.visibility</p:attrName>
+                                        </p:attrNameLst>
+                                      </p:cBhvr>
+                                      <p:to>
+                                        <p:strVal val="visible"/>
+                                      </p:to>
+                                    </p:set>
+                                  </p:childTnLst>
+                                </p:cTn>
+                              </p:par>
+                              <p:par>
+                                <p:cTn id="21" presetID="1" presetClass="entr" presetSubtype="0" fill="hold" nodeType="withEffect">
+                                  <p:stCondLst>
+                                    <p:cond delay="0"/>
+                                  </p:stCondLst>
+                                  <p:childTnLst>
+                                    <p:set>
+                                      <p:cBhvr>
+                                        <p:cTn id="22" dur="1" fill="hold">
+                                          <p:stCondLst>
+                                            <p:cond delay="0"/>
+                                          </p:stCondLst>
+                                        </p:cTn>
+                                        <p:tgtEl>
+                                          <p:spTgt spid="3">
+                                            <p:txEl>
+                                              <p:pRg st="7" end="7"/>
+                                            </p:txEl>
+                                          </p:spTgt>
+                                        </p:tgtEl>
+                                        <p:attrNameLst>
+                                          <p:attrName>style.visibility</p:attrName>
+                                        </p:attrNameLst>
+                                      </p:cBhvr>
+                                      <p:to>
+                                        <p:strVal val="visible"/>
+                                      </p:to>
+                                    </p:set>
+                                  </p:childTnLst>
+                                </p:cTn>
+                              </p:par>
+                            </p:childTnLst>
+                          </p:cTn>
+                        </p:par>
+                      </p:childTnLst>
+                    </p:cTn>
+                  </p:par>
+                </p:childTnLst>
+              </p:cTn>
+              <p:prevCondLst>
+                <p:cond evt="onPrev" delay="0">
+                  <p:tgtEl>
+                    <p:sldTgt/>
+                  </p:tgtEl>
+                </p:cond>
+              </p:prevCondLst>
+              <p:nextCondLst>
+                <p:cond evt="onNext" delay="0">
+                  <p:tgtEl>
+                    <p:sldTgt/>
+                  </p:tgtEl>
+                </p:cond>
+              </p:nextCondLst>
+            </p:seq>
+          </p:childTnLst>
+        </p:cTn>
+      </p:par>
+    </p:tnLst>
+  </p:timing>
   <p:extLst>
     <p:ext uri="{6950BFC3-D8DA-4A85-94F7-54DA5524770B}">
       <p188:commentRel xmlns:p188="http://schemas.microsoft.com/office/powerpoint/2018/8/main" r:id="rId3"/>
@@ -10075,6 +10982,114 @@
           </a:prstGeom>
         </p:spPr>
       </p:pic>
+      <p:grpSp>
+        <p:nvGrpSpPr>
+          <p:cNvPr id="9" name="Group 8">
+            <a:extLst>
+              <a:ext uri="{FF2B5EF4-FFF2-40B4-BE49-F238E27FC236}">
+                <a16:creationId xmlns:a16="http://schemas.microsoft.com/office/drawing/2014/main" id="{4312DEAB-D003-C39D-6527-102D9FD213EF}"/>
+              </a:ext>
+            </a:extLst>
+          </p:cNvPr>
+          <p:cNvGrpSpPr/>
+          <p:nvPr/>
+        </p:nvGrpSpPr>
+        <p:grpSpPr>
+          <a:xfrm>
+            <a:off x="11296650" y="182642"/>
+            <a:ext cx="904830" cy="1090894"/>
+            <a:chOff x="11296650" y="182642"/>
+            <a:chExt cx="904830" cy="1090894"/>
+          </a:xfrm>
+        </p:grpSpPr>
+        <p:pic>
+          <p:nvPicPr>
+            <p:cNvPr id="6" name="Picture 2" descr="American Community Survey (ACS) – Roadmap to the 2030 Census">
+              <a:extLst>
+                <a:ext uri="{FF2B5EF4-FFF2-40B4-BE49-F238E27FC236}">
+                  <a16:creationId xmlns:a16="http://schemas.microsoft.com/office/drawing/2014/main" id="{D4250FAF-4A00-729A-BFBF-0CC257D406F0}"/>
+                </a:ext>
+              </a:extLst>
+            </p:cNvPr>
+            <p:cNvPicPr>
+              <a:picLocks noChangeAspect="1" noChangeArrowheads="1"/>
+            </p:cNvPicPr>
+            <p:nvPr/>
+          </p:nvPicPr>
+          <p:blipFill>
+            <a:blip r:embed="rId4">
+              <a:extLst>
+                <a:ext uri="{28A0092B-C50C-407E-A947-70E740481C1C}">
+                  <a14:useLocalDpi xmlns:a14="http://schemas.microsoft.com/office/drawing/2010/main" val="0"/>
+                </a:ext>
+              </a:extLst>
+            </a:blip>
+            <a:srcRect/>
+            <a:stretch>
+              <a:fillRect/>
+            </a:stretch>
+          </p:blipFill>
+          <p:spPr bwMode="auto">
+            <a:xfrm>
+              <a:off x="11308814" y="182642"/>
+              <a:ext cx="750376" cy="750376"/>
+            </a:xfrm>
+            <a:prstGeom prst="rect">
+              <a:avLst/>
+            </a:prstGeom>
+            <a:noFill/>
+            <a:extLst>
+              <a:ext uri="{909E8E84-426E-40DD-AFC4-6F175D3DCCD1}">
+                <a14:hiddenFill xmlns:a14="http://schemas.microsoft.com/office/drawing/2010/main">
+                  <a:solidFill>
+                    <a:srgbClr val="FFFFFF"/>
+                  </a:solidFill>
+                </a14:hiddenFill>
+              </a:ext>
+            </a:extLst>
+          </p:spPr>
+        </p:pic>
+        <p:sp>
+          <p:nvSpPr>
+            <p:cNvPr id="8" name="TextBox 7">
+              <a:extLst>
+                <a:ext uri="{FF2B5EF4-FFF2-40B4-BE49-F238E27FC236}">
+                  <a16:creationId xmlns:a16="http://schemas.microsoft.com/office/drawing/2014/main" id="{486FFC01-6145-D124-06D1-95BAAB7E4478}"/>
+                </a:ext>
+              </a:extLst>
+            </p:cNvPr>
+            <p:cNvSpPr txBox="1"/>
+            <p:nvPr/>
+          </p:nvSpPr>
+          <p:spPr>
+            <a:xfrm>
+              <a:off x="11296650" y="934982"/>
+              <a:ext cx="904830" cy="338554"/>
+            </a:xfrm>
+            <a:prstGeom prst="rect">
+              <a:avLst/>
+            </a:prstGeom>
+            <a:noFill/>
+          </p:spPr>
+          <p:txBody>
+            <a:bodyPr wrap="square" rtlCol="0">
+              <a:spAutoFit/>
+            </a:bodyPr>
+            <a:lstStyle/>
+            <a:p>
+              <a:r>
+                <a:rPr lang="en-US" sz="1600" dirty="0">
+                  <a:latin typeface="Abadi MT Condensed Light" panose="020B0306030101010103" pitchFamily="34" charset="77"/>
+                </a:rPr>
+                <a:t>2016-20</a:t>
+              </a:r>
+              <a:endParaRPr lang="en-US" dirty="0">
+                <a:latin typeface="Abadi MT Condensed Light" panose="020B0306030101010103" pitchFamily="34" charset="77"/>
+              </a:endParaRPr>
+            </a:p>
+          </p:txBody>
+        </p:sp>
+      </p:grpSp>
     </p:spTree>
     <p:extLst>
       <p:ext uri="{BB962C8B-B14F-4D97-AF65-F5344CB8AC3E}">
@@ -10140,12 +11155,41 @@
           </a:p>
         </p:txBody>
       </p:sp>
+      <p:pic>
+        <p:nvPicPr>
+          <p:cNvPr id="8" name="Picture 7">
+            <a:extLst>
+              <a:ext uri="{FF2B5EF4-FFF2-40B4-BE49-F238E27FC236}">
+                <a16:creationId xmlns:a16="http://schemas.microsoft.com/office/drawing/2014/main" id="{4497AAAA-15E1-3643-4B70-8F75550F6E48}"/>
+              </a:ext>
+            </a:extLst>
+          </p:cNvPr>
+          <p:cNvPicPr>
+            <a:picLocks noChangeAspect="1"/>
+          </p:cNvPicPr>
+          <p:nvPr/>
+        </p:nvPicPr>
+        <p:blipFill>
+          <a:blip r:embed="rId3"/>
+          <a:srcRect/>
+          <a:stretch/>
+        </p:blipFill>
+        <p:spPr>
+          <a:xfrm>
+            <a:off x="487680" y="1249680"/>
+            <a:ext cx="11216640" cy="5608320"/>
+          </a:xfrm>
+          <a:prstGeom prst="rect">
+            <a:avLst/>
+          </a:prstGeom>
+        </p:spPr>
+      </p:pic>
       <p:grpSp>
         <p:nvGrpSpPr>
-          <p:cNvPr id="21" name="Group 20">
-            <a:extLst>
-              <a:ext uri="{FF2B5EF4-FFF2-40B4-BE49-F238E27FC236}">
-                <a16:creationId xmlns:a16="http://schemas.microsoft.com/office/drawing/2014/main" id="{F733472E-F5FC-B479-8BDB-848400D2B901}"/>
+          <p:cNvPr id="3" name="Group 2">
+            <a:extLst>
+              <a:ext uri="{FF2B5EF4-FFF2-40B4-BE49-F238E27FC236}">
+                <a16:creationId xmlns:a16="http://schemas.microsoft.com/office/drawing/2014/main" id="{6EBBC8D8-50C1-DEB4-0B1A-0FC770EEA1A2}"/>
               </a:ext>
             </a:extLst>
           </p:cNvPr>
@@ -10154,18 +11198,18 @@
         </p:nvGrpSpPr>
         <p:grpSpPr>
           <a:xfrm>
-            <a:off x="11308814" y="182642"/>
-            <a:ext cx="796458" cy="1088930"/>
-            <a:chOff x="10951180" y="240224"/>
-            <a:chExt cx="796458" cy="1088930"/>
+            <a:off x="11296650" y="182642"/>
+            <a:ext cx="904830" cy="1090894"/>
+            <a:chOff x="11296650" y="182642"/>
+            <a:chExt cx="904830" cy="1090894"/>
           </a:xfrm>
         </p:grpSpPr>
         <p:pic>
           <p:nvPicPr>
-            <p:cNvPr id="22" name="Picture 2" descr="American Community Survey (ACS) – Roadmap to the 2030 Census">
+            <p:cNvPr id="4" name="Picture 2" descr="American Community Survey (ACS) – Roadmap to the 2030 Census">
               <a:extLst>
                 <a:ext uri="{FF2B5EF4-FFF2-40B4-BE49-F238E27FC236}">
-                  <a16:creationId xmlns:a16="http://schemas.microsoft.com/office/drawing/2014/main" id="{0EC57513-768B-44B6-30AA-1F369C9D3E27}"/>
+                  <a16:creationId xmlns:a16="http://schemas.microsoft.com/office/drawing/2014/main" id="{606D3571-7630-812D-857E-DFC6B8A88F9D}"/>
                 </a:ext>
               </a:extLst>
             </p:cNvPr>
@@ -10175,7 +11219,7 @@
             <p:nvPr/>
           </p:nvPicPr>
           <p:blipFill>
-            <a:blip r:embed="rId3">
+            <a:blip r:embed="rId4">
               <a:extLst>
                 <a:ext uri="{28A0092B-C50C-407E-A947-70E740481C1C}">
                   <a14:useLocalDpi xmlns:a14="http://schemas.microsoft.com/office/drawing/2010/main" val="0"/>
@@ -10189,7 +11233,7 @@
           </p:blipFill>
           <p:spPr bwMode="auto">
             <a:xfrm>
-              <a:off x="10951180" y="240224"/>
+              <a:off x="11308814" y="182642"/>
               <a:ext cx="750376" cy="750376"/>
             </a:xfrm>
             <a:prstGeom prst="rect">
@@ -10209,10 +11253,10 @@
         </p:pic>
         <p:sp>
           <p:nvSpPr>
-            <p:cNvPr id="23" name="TextBox 22">
+            <p:cNvPr id="5" name="TextBox 4">
               <a:extLst>
                 <a:ext uri="{FF2B5EF4-FFF2-40B4-BE49-F238E27FC236}">
-                  <a16:creationId xmlns:a16="http://schemas.microsoft.com/office/drawing/2014/main" id="{17CAC53A-2941-088A-5742-A4117BF9C25B}"/>
+                  <a16:creationId xmlns:a16="http://schemas.microsoft.com/office/drawing/2014/main" id="{5AEBA771-EF82-DC00-5A85-73BD8F0B8998}"/>
                 </a:ext>
               </a:extLst>
             </p:cNvPr>
@@ -10221,8 +11265,8 @@
           </p:nvSpPr>
           <p:spPr>
             <a:xfrm>
-              <a:off x="11043344" y="990600"/>
-              <a:ext cx="704294" cy="338554"/>
+              <a:off x="11296650" y="934982"/>
+              <a:ext cx="904830" cy="338554"/>
             </a:xfrm>
             <a:prstGeom prst="rect">
               <a:avLst/>
@@ -10239,42 +11283,15 @@
                 <a:rPr lang="en-US" sz="1600" dirty="0">
                   <a:latin typeface="Abadi MT Condensed Light" panose="020B0306030101010103" pitchFamily="34" charset="77"/>
                 </a:rPr>
-                <a:t>2020</a:t>
+                <a:t>2016-20</a:t>
               </a:r>
-              <a:endParaRPr lang="en-US" dirty="0"/>
+              <a:endParaRPr lang="en-US" dirty="0">
+                <a:latin typeface="Abadi MT Condensed Light" panose="020B0306030101010103" pitchFamily="34" charset="77"/>
+              </a:endParaRPr>
             </a:p>
           </p:txBody>
         </p:sp>
       </p:grpSp>
-      <p:pic>
-        <p:nvPicPr>
-          <p:cNvPr id="8" name="Picture 7">
-            <a:extLst>
-              <a:ext uri="{FF2B5EF4-FFF2-40B4-BE49-F238E27FC236}">
-                <a16:creationId xmlns:a16="http://schemas.microsoft.com/office/drawing/2014/main" id="{4497AAAA-15E1-3643-4B70-8F75550F6E48}"/>
-              </a:ext>
-            </a:extLst>
-          </p:cNvPr>
-          <p:cNvPicPr>
-            <a:picLocks noChangeAspect="1"/>
-          </p:cNvPicPr>
-          <p:nvPr/>
-        </p:nvPicPr>
-        <p:blipFill>
-          <a:blip r:embed="rId4"/>
-          <a:srcRect/>
-          <a:stretch/>
-        </p:blipFill>
-        <p:spPr>
-          <a:xfrm>
-            <a:off x="487680" y="1249680"/>
-            <a:ext cx="11216640" cy="5608320"/>
-          </a:xfrm>
-          <a:prstGeom prst="rect">
-            <a:avLst/>
-          </a:prstGeom>
-        </p:spPr>
-      </p:pic>
     </p:spTree>
     <p:extLst>
       <p:ext uri="{BB962C8B-B14F-4D97-AF65-F5344CB8AC3E}">
@@ -10443,12 +11460,41 @@
           </a:p>
         </p:txBody>
       </p:sp>
+      <p:pic>
+        <p:nvPicPr>
+          <p:cNvPr id="10" name="Picture 9">
+            <a:extLst>
+              <a:ext uri="{FF2B5EF4-FFF2-40B4-BE49-F238E27FC236}">
+                <a16:creationId xmlns:a16="http://schemas.microsoft.com/office/drawing/2014/main" id="{DEF8C3E0-2D5A-9362-9990-E515B527CE21}"/>
+              </a:ext>
+            </a:extLst>
+          </p:cNvPr>
+          <p:cNvPicPr>
+            <a:picLocks noChangeAspect="1"/>
+          </p:cNvPicPr>
+          <p:nvPr/>
+        </p:nvPicPr>
+        <p:blipFill>
+          <a:blip r:embed="rId4"/>
+          <a:srcRect/>
+          <a:stretch/>
+        </p:blipFill>
+        <p:spPr>
+          <a:xfrm>
+            <a:off x="6174678" y="2123868"/>
+            <a:ext cx="5851915" cy="4551490"/>
+          </a:xfrm>
+          <a:prstGeom prst="rect">
+            <a:avLst/>
+          </a:prstGeom>
+        </p:spPr>
+      </p:pic>
       <p:grpSp>
         <p:nvGrpSpPr>
-          <p:cNvPr id="6" name="Group 5">
-            <a:extLst>
-              <a:ext uri="{FF2B5EF4-FFF2-40B4-BE49-F238E27FC236}">
-                <a16:creationId xmlns:a16="http://schemas.microsoft.com/office/drawing/2014/main" id="{619E7C62-EDD6-FF2F-2AB3-3632706493D9}"/>
+          <p:cNvPr id="11" name="Group 10">
+            <a:extLst>
+              <a:ext uri="{FF2B5EF4-FFF2-40B4-BE49-F238E27FC236}">
+                <a16:creationId xmlns:a16="http://schemas.microsoft.com/office/drawing/2014/main" id="{6F31834E-7325-72CB-B60B-A36735DDB993}"/>
               </a:ext>
             </a:extLst>
           </p:cNvPr>
@@ -10457,18 +11503,18 @@
         </p:nvGrpSpPr>
         <p:grpSpPr>
           <a:xfrm>
-            <a:off x="11308814" y="182642"/>
-            <a:ext cx="796458" cy="1088930"/>
-            <a:chOff x="10951180" y="240224"/>
-            <a:chExt cx="796458" cy="1088930"/>
+            <a:off x="11296650" y="182642"/>
+            <a:ext cx="904830" cy="1090894"/>
+            <a:chOff x="11296650" y="182642"/>
+            <a:chExt cx="904830" cy="1090894"/>
           </a:xfrm>
         </p:grpSpPr>
         <p:pic>
           <p:nvPicPr>
-            <p:cNvPr id="8" name="Picture 2" descr="American Community Survey (ACS) – Roadmap to the 2030 Census">
+            <p:cNvPr id="12" name="Picture 2" descr="American Community Survey (ACS) – Roadmap to the 2030 Census">
               <a:extLst>
                 <a:ext uri="{FF2B5EF4-FFF2-40B4-BE49-F238E27FC236}">
-                  <a16:creationId xmlns:a16="http://schemas.microsoft.com/office/drawing/2014/main" id="{EC48EE0F-8982-CEEB-FFE2-A917688FC860}"/>
+                  <a16:creationId xmlns:a16="http://schemas.microsoft.com/office/drawing/2014/main" id="{43DEA240-C76D-1AFE-5E4D-5BEE1D9474AC}"/>
                 </a:ext>
               </a:extLst>
             </p:cNvPr>
@@ -10478,7 +11524,7 @@
             <p:nvPr/>
           </p:nvPicPr>
           <p:blipFill>
-            <a:blip r:embed="rId4">
+            <a:blip r:embed="rId5">
               <a:extLst>
                 <a:ext uri="{28A0092B-C50C-407E-A947-70E740481C1C}">
                   <a14:useLocalDpi xmlns:a14="http://schemas.microsoft.com/office/drawing/2010/main" val="0"/>
@@ -10492,7 +11538,7 @@
           </p:blipFill>
           <p:spPr bwMode="auto">
             <a:xfrm>
-              <a:off x="10951180" y="240224"/>
+              <a:off x="11308814" y="182642"/>
               <a:ext cx="750376" cy="750376"/>
             </a:xfrm>
             <a:prstGeom prst="rect">
@@ -10512,10 +11558,10 @@
         </p:pic>
         <p:sp>
           <p:nvSpPr>
-            <p:cNvPr id="9" name="TextBox 8">
+            <p:cNvPr id="13" name="TextBox 12">
               <a:extLst>
                 <a:ext uri="{FF2B5EF4-FFF2-40B4-BE49-F238E27FC236}">
-                  <a16:creationId xmlns:a16="http://schemas.microsoft.com/office/drawing/2014/main" id="{90FBB281-7AE0-9352-917C-87AEAE5B751F}"/>
+                  <a16:creationId xmlns:a16="http://schemas.microsoft.com/office/drawing/2014/main" id="{0B7D3204-4F11-9675-34C4-AE14B9346F65}"/>
                 </a:ext>
               </a:extLst>
             </p:cNvPr>
@@ -10524,8 +11570,8 @@
           </p:nvSpPr>
           <p:spPr>
             <a:xfrm>
-              <a:off x="11043344" y="990600"/>
-              <a:ext cx="704294" cy="338554"/>
+              <a:off x="11296650" y="934982"/>
+              <a:ext cx="904830" cy="338554"/>
             </a:xfrm>
             <a:prstGeom prst="rect">
               <a:avLst/>
@@ -10542,42 +11588,15 @@
                 <a:rPr lang="en-US" sz="1600" dirty="0">
                   <a:latin typeface="Abadi MT Condensed Light" panose="020B0306030101010103" pitchFamily="34" charset="77"/>
                 </a:rPr>
-                <a:t>2020</a:t>
+                <a:t>2016-20</a:t>
               </a:r>
-              <a:endParaRPr lang="en-US" dirty="0"/>
+              <a:endParaRPr lang="en-US" dirty="0">
+                <a:latin typeface="Abadi MT Condensed Light" panose="020B0306030101010103" pitchFamily="34" charset="77"/>
+              </a:endParaRPr>
             </a:p>
           </p:txBody>
         </p:sp>
       </p:grpSp>
-      <p:pic>
-        <p:nvPicPr>
-          <p:cNvPr id="10" name="Picture 9">
-            <a:extLst>
-              <a:ext uri="{FF2B5EF4-FFF2-40B4-BE49-F238E27FC236}">
-                <a16:creationId xmlns:a16="http://schemas.microsoft.com/office/drawing/2014/main" id="{DEF8C3E0-2D5A-9362-9990-E515B527CE21}"/>
-              </a:ext>
-            </a:extLst>
-          </p:cNvPr>
-          <p:cNvPicPr>
-            <a:picLocks noChangeAspect="1"/>
-          </p:cNvPicPr>
-          <p:nvPr/>
-        </p:nvPicPr>
-        <p:blipFill>
-          <a:blip r:embed="rId5"/>
-          <a:srcRect/>
-          <a:stretch/>
-        </p:blipFill>
-        <p:spPr>
-          <a:xfrm>
-            <a:off x="6174678" y="2123868"/>
-            <a:ext cx="5851915" cy="4551490"/>
-          </a:xfrm>
-          <a:prstGeom prst="rect">
-            <a:avLst/>
-          </a:prstGeom>
-        </p:spPr>
-      </p:pic>
     </p:spTree>
     <p:extLst>
       <p:ext uri="{BB962C8B-B14F-4D97-AF65-F5344CB8AC3E}">
@@ -10678,12 +11697,42 @@
           </a:p>
         </p:txBody>
       </p:sp>
+      <p:pic>
+        <p:nvPicPr>
+          <p:cNvPr id="10" name="Picture 9" descr="A graph with different colored squares&#10;&#10;AI-generated content may be incorrect.">
+            <a:extLst>
+              <a:ext uri="{FF2B5EF4-FFF2-40B4-BE49-F238E27FC236}">
+                <a16:creationId xmlns:a16="http://schemas.microsoft.com/office/drawing/2014/main" id="{4D2FC79A-AA1A-DAF3-6B89-F750E3C132CB}"/>
+              </a:ext>
+            </a:extLst>
+          </p:cNvPr>
+          <p:cNvPicPr>
+            <a:picLocks noChangeAspect="1"/>
+          </p:cNvPicPr>
+          <p:nvPr/>
+        </p:nvPicPr>
+        <p:blipFill>
+          <a:blip r:embed="rId3"/>
+          <a:stretch>
+            <a:fillRect/>
+          </a:stretch>
+        </p:blipFill>
+        <p:spPr>
+          <a:xfrm>
+            <a:off x="1020278" y="1928260"/>
+            <a:ext cx="9859478" cy="4929739"/>
+          </a:xfrm>
+          <a:prstGeom prst="rect">
+            <a:avLst/>
+          </a:prstGeom>
+        </p:spPr>
+      </p:pic>
       <p:grpSp>
         <p:nvGrpSpPr>
-          <p:cNvPr id="5" name="Group 4">
-            <a:extLst>
-              <a:ext uri="{FF2B5EF4-FFF2-40B4-BE49-F238E27FC236}">
-                <a16:creationId xmlns:a16="http://schemas.microsoft.com/office/drawing/2014/main" id="{2CF4DA50-70D5-6336-650E-37AF11C837CB}"/>
+          <p:cNvPr id="17" name="Group 16">
+            <a:extLst>
+              <a:ext uri="{FF2B5EF4-FFF2-40B4-BE49-F238E27FC236}">
+                <a16:creationId xmlns:a16="http://schemas.microsoft.com/office/drawing/2014/main" id="{C92D5170-78D1-8ED5-A793-9C4D8CF37793}"/>
               </a:ext>
             </a:extLst>
           </p:cNvPr>
@@ -10692,18 +11741,18 @@
         </p:nvGrpSpPr>
         <p:grpSpPr>
           <a:xfrm>
-            <a:off x="11214652" y="132392"/>
-            <a:ext cx="788708" cy="1100420"/>
-            <a:chOff x="10951180" y="240224"/>
-            <a:chExt cx="788708" cy="1100420"/>
+            <a:off x="11296650" y="182642"/>
+            <a:ext cx="904830" cy="1090894"/>
+            <a:chOff x="11296650" y="182642"/>
+            <a:chExt cx="904830" cy="1090894"/>
           </a:xfrm>
         </p:grpSpPr>
         <p:pic>
           <p:nvPicPr>
-            <p:cNvPr id="5122" name="Picture 2" descr="American Community Survey (ACS) – Roadmap to the 2030 Census">
+            <p:cNvPr id="18" name="Picture 2" descr="American Community Survey (ACS) – Roadmap to the 2030 Census">
               <a:extLst>
                 <a:ext uri="{FF2B5EF4-FFF2-40B4-BE49-F238E27FC236}">
-                  <a16:creationId xmlns:a16="http://schemas.microsoft.com/office/drawing/2014/main" id="{347DA099-9011-C72F-97EE-0BD73E1F2634}"/>
+                  <a16:creationId xmlns:a16="http://schemas.microsoft.com/office/drawing/2014/main" id="{4EA59C40-4A3E-39F3-9E7D-4D48A8D76314}"/>
                 </a:ext>
               </a:extLst>
             </p:cNvPr>
@@ -10713,7 +11762,7 @@
             <p:nvPr/>
           </p:nvPicPr>
           <p:blipFill>
-            <a:blip r:embed="rId3">
+            <a:blip r:embed="rId4">
               <a:extLst>
                 <a:ext uri="{28A0092B-C50C-407E-A947-70E740481C1C}">
                   <a14:useLocalDpi xmlns:a14="http://schemas.microsoft.com/office/drawing/2010/main" val="0"/>
@@ -10727,7 +11776,7 @@
           </p:blipFill>
           <p:spPr bwMode="auto">
             <a:xfrm>
-              <a:off x="10951180" y="240224"/>
+              <a:off x="11308814" y="182642"/>
               <a:ext cx="750376" cy="750376"/>
             </a:xfrm>
             <a:prstGeom prst="rect">
@@ -10747,10 +11796,10 @@
         </p:pic>
         <p:sp>
           <p:nvSpPr>
-            <p:cNvPr id="4" name="TextBox 3">
+            <p:cNvPr id="19" name="TextBox 18">
               <a:extLst>
                 <a:ext uri="{FF2B5EF4-FFF2-40B4-BE49-F238E27FC236}">
-                  <a16:creationId xmlns:a16="http://schemas.microsoft.com/office/drawing/2014/main" id="{BE26AC53-CE31-75D6-6B9D-2A0CA83C3DE0}"/>
+                  <a16:creationId xmlns:a16="http://schemas.microsoft.com/office/drawing/2014/main" id="{59541BD6-F40D-C5E4-4B20-96D8D2F311E4}"/>
                 </a:ext>
               </a:extLst>
             </p:cNvPr>
@@ -10759,8 +11808,8 @@
           </p:nvSpPr>
           <p:spPr>
             <a:xfrm>
-              <a:off x="11035594" y="1002090"/>
-              <a:ext cx="704294" cy="338554"/>
+              <a:off x="11296650" y="934982"/>
+              <a:ext cx="904830" cy="338554"/>
             </a:xfrm>
             <a:prstGeom prst="rect">
               <a:avLst/>
@@ -10777,7 +11826,7 @@
                 <a:rPr lang="en-US" sz="1600" dirty="0">
                   <a:latin typeface="Abadi MT Condensed Light" panose="020B0306030101010103" pitchFamily="34" charset="77"/>
                 </a:rPr>
-                <a:t>2020</a:t>
+                <a:t>2016-20</a:t>
               </a:r>
               <a:endParaRPr lang="en-US" dirty="0">
                 <a:latin typeface="Abadi MT Condensed Light" panose="020B0306030101010103" pitchFamily="34" charset="77"/>
@@ -10786,36 +11835,6 @@
           </p:txBody>
         </p:sp>
       </p:grpSp>
-      <p:pic>
-        <p:nvPicPr>
-          <p:cNvPr id="10" name="Picture 9" descr="A graph with different colored squares&#10;&#10;AI-generated content may be incorrect.">
-            <a:extLst>
-              <a:ext uri="{FF2B5EF4-FFF2-40B4-BE49-F238E27FC236}">
-                <a16:creationId xmlns:a16="http://schemas.microsoft.com/office/drawing/2014/main" id="{4D2FC79A-AA1A-DAF3-6B89-F750E3C132CB}"/>
-              </a:ext>
-            </a:extLst>
-          </p:cNvPr>
-          <p:cNvPicPr>
-            <a:picLocks noChangeAspect="1"/>
-          </p:cNvPicPr>
-          <p:nvPr/>
-        </p:nvPicPr>
-        <p:blipFill>
-          <a:blip r:embed="rId4"/>
-          <a:stretch>
-            <a:fillRect/>
-          </a:stretch>
-        </p:blipFill>
-        <p:spPr>
-          <a:xfrm>
-            <a:off x="1020278" y="1928260"/>
-            <a:ext cx="9859478" cy="4929739"/>
-          </a:xfrm>
-          <a:prstGeom prst="rect">
-            <a:avLst/>
-          </a:prstGeom>
-        </p:spPr>
-      </p:pic>
     </p:spTree>
     <p:extLst>
       <p:ext uri="{BB962C8B-B14F-4D97-AF65-F5344CB8AC3E}">

</xml_diff>